<commit_message>
actualización de métricas, agregué una de Pivotal
</commit_message>
<xml_diff>
--- a/documentacion/Presentacion Final ReserBar/Presentacion Final.pptx
+++ b/documentacion/Presentacion Final ReserBar/Presentacion Final.pptx
@@ -5,7 +5,7 @@
     <p:sldMasterId id="2147483780" r:id="rId1"/>
   </p:sldMasterIdLst>
   <p:notesMasterIdLst>
-    <p:notesMasterId r:id="rId22"/>
+    <p:notesMasterId r:id="rId23"/>
   </p:notesMasterIdLst>
   <p:sldIdLst>
     <p:sldId id="256" r:id="rId2"/>
@@ -16,18 +16,19 @@
     <p:sldId id="274" r:id="rId7"/>
     <p:sldId id="260" r:id="rId8"/>
     <p:sldId id="261" r:id="rId9"/>
-    <p:sldId id="271" r:id="rId10"/>
-    <p:sldId id="267" r:id="rId11"/>
-    <p:sldId id="265" r:id="rId12"/>
-    <p:sldId id="275" r:id="rId13"/>
-    <p:sldId id="263" r:id="rId14"/>
-    <p:sldId id="268" r:id="rId15"/>
-    <p:sldId id="269" r:id="rId16"/>
-    <p:sldId id="270" r:id="rId17"/>
-    <p:sldId id="276" r:id="rId18"/>
-    <p:sldId id="277" r:id="rId19"/>
-    <p:sldId id="264" r:id="rId20"/>
-    <p:sldId id="266" r:id="rId21"/>
+    <p:sldId id="278" r:id="rId10"/>
+    <p:sldId id="271" r:id="rId11"/>
+    <p:sldId id="267" r:id="rId12"/>
+    <p:sldId id="265" r:id="rId13"/>
+    <p:sldId id="275" r:id="rId14"/>
+    <p:sldId id="263" r:id="rId15"/>
+    <p:sldId id="268" r:id="rId16"/>
+    <p:sldId id="269" r:id="rId17"/>
+    <p:sldId id="270" r:id="rId18"/>
+    <p:sldId id="276" r:id="rId19"/>
+    <p:sldId id="277" r:id="rId20"/>
+    <p:sldId id="264" r:id="rId21"/>
+    <p:sldId id="266" r:id="rId22"/>
   </p:sldIdLst>
   <p:sldSz cx="9144000" cy="6858000" type="screen4x3"/>
   <p:notesSz cx="6858000" cy="9144000"/>
@@ -738,7 +739,7 @@
             <a:fld id="{E23A4E81-B9B9-43AC-B5C1-55C66F4B354D}" type="slidenum">
               <a:rPr lang="es-AR" smtClean="0"/>
               <a:pPr/>
-              <a:t>10</a:t>
+              <a:t>11</a:t>
             </a:fld>
             <a:endParaRPr lang="es-AR"/>
           </a:p>
@@ -896,7 +897,7 @@
             <a:fld id="{E23A4E81-B9B9-43AC-B5C1-55C66F4B354D}" type="slidenum">
               <a:rPr lang="es-AR" smtClean="0"/>
               <a:pPr/>
-              <a:t>19</a:t>
+              <a:t>20</a:t>
             </a:fld>
             <a:endParaRPr lang="es-AR"/>
           </a:p>
@@ -5687,6 +5688,1766 @@
           </a:p>
         </p:txBody>
       </p:sp>
+      <p:sp>
+        <p:nvSpPr>
+          <p:cNvPr id="6" name="5 CuadroTexto"/>
+          <p:cNvSpPr txBox="1"/>
+          <p:nvPr/>
+        </p:nvSpPr>
+        <p:spPr>
+          <a:xfrm>
+            <a:off x="9324528" y="1857364"/>
+            <a:ext cx="2793842" cy="353943"/>
+          </a:xfrm>
+          <a:prstGeom prst="rect">
+            <a:avLst/>
+          </a:prstGeom>
+          <a:noFill/>
+        </p:spPr>
+        <p:txBody>
+          <a:bodyPr wrap="none" rtlCol="0">
+            <a:spAutoFit/>
+          </a:bodyPr>
+          <a:lstStyle/>
+          <a:p>
+            <a:r>
+              <a:rPr lang="es-AR" sz="1700" dirty="0" smtClean="0">
+                <a:latin typeface="Corbel" pitchFamily="34" charset="0"/>
+              </a:rPr>
+              <a:t>Cantidad de Casos de Prueba</a:t>
+            </a:r>
+            <a:endParaRPr lang="es-AR" sz="1700" dirty="0">
+              <a:latin typeface="Corbel" pitchFamily="34" charset="0"/>
+            </a:endParaRPr>
+          </a:p>
+        </p:txBody>
+      </p:sp>
+      <p:sp>
+        <p:nvSpPr>
+          <p:cNvPr id="7" name="6 CuadroTexto"/>
+          <p:cNvSpPr txBox="1"/>
+          <p:nvPr/>
+        </p:nvSpPr>
+        <p:spPr>
+          <a:xfrm>
+            <a:off x="12329992" y="1857364"/>
+            <a:ext cx="574196" cy="338554"/>
+          </a:xfrm>
+          <a:prstGeom prst="rect">
+            <a:avLst/>
+          </a:prstGeom>
+          <a:noFill/>
+        </p:spPr>
+        <p:txBody>
+          <a:bodyPr wrap="none" rtlCol="0">
+            <a:spAutoFit/>
+          </a:bodyPr>
+          <a:lstStyle/>
+          <a:p>
+            <a:r>
+              <a:rPr lang="es-AR" sz="1600" dirty="0" smtClean="0"/>
+              <a:t>383</a:t>
+            </a:r>
+            <a:endParaRPr lang="es-AR" sz="1600" dirty="0"/>
+          </a:p>
+        </p:txBody>
+      </p:sp>
+      <p:sp>
+        <p:nvSpPr>
+          <p:cNvPr id="8" name="7 CuadroTexto"/>
+          <p:cNvSpPr txBox="1"/>
+          <p:nvPr/>
+        </p:nvSpPr>
+        <p:spPr>
+          <a:xfrm>
+            <a:off x="9267362" y="2571744"/>
+            <a:ext cx="1814920" cy="353943"/>
+          </a:xfrm>
+          <a:prstGeom prst="rect">
+            <a:avLst/>
+          </a:prstGeom>
+          <a:noFill/>
+        </p:spPr>
+        <p:txBody>
+          <a:bodyPr wrap="none" rtlCol="0">
+            <a:spAutoFit/>
+          </a:bodyPr>
+          <a:lstStyle/>
+          <a:p>
+            <a:r>
+              <a:rPr lang="es-AR" sz="1700" dirty="0" smtClean="0">
+                <a:latin typeface="Corbel" pitchFamily="34" charset="0"/>
+              </a:rPr>
+              <a:t>Criterio de Parada</a:t>
+            </a:r>
+            <a:endParaRPr lang="es-AR" sz="1700" dirty="0">
+              <a:latin typeface="Corbel" pitchFamily="34" charset="0"/>
+            </a:endParaRPr>
+          </a:p>
+        </p:txBody>
+      </p:sp>
+      <p:sp>
+        <p:nvSpPr>
+          <p:cNvPr id="10" name="9 CuadroTexto"/>
+          <p:cNvSpPr txBox="1"/>
+          <p:nvPr/>
+        </p:nvSpPr>
+        <p:spPr>
+          <a:xfrm>
+            <a:off x="9274569" y="3789437"/>
+            <a:ext cx="2188484" cy="353943"/>
+          </a:xfrm>
+          <a:prstGeom prst="rect">
+            <a:avLst/>
+          </a:prstGeom>
+          <a:noFill/>
+        </p:spPr>
+        <p:txBody>
+          <a:bodyPr wrap="none" rtlCol="0">
+            <a:spAutoFit/>
+          </a:bodyPr>
+          <a:lstStyle/>
+          <a:p>
+            <a:r>
+              <a:rPr lang="es-AR" sz="1700" dirty="0" smtClean="0">
+                <a:latin typeface="Corbel" pitchFamily="34" charset="0"/>
+              </a:rPr>
+              <a:t>Criterio de Aceptación</a:t>
+            </a:r>
+            <a:endParaRPr lang="es-AR" sz="1700" dirty="0">
+              <a:latin typeface="Corbel" pitchFamily="34" charset="0"/>
+            </a:endParaRPr>
+          </a:p>
+        </p:txBody>
+      </p:sp>
+      <p:sp>
+        <p:nvSpPr>
+          <p:cNvPr id="12" name="11 CuadroTexto"/>
+          <p:cNvSpPr txBox="1"/>
+          <p:nvPr/>
+        </p:nvSpPr>
+        <p:spPr>
+          <a:xfrm>
+            <a:off x="9252520" y="5218197"/>
+            <a:ext cx="2281971" cy="353943"/>
+          </a:xfrm>
+          <a:prstGeom prst="rect">
+            <a:avLst/>
+          </a:prstGeom>
+          <a:noFill/>
+        </p:spPr>
+        <p:txBody>
+          <a:bodyPr wrap="none" rtlCol="0">
+            <a:spAutoFit/>
+          </a:bodyPr>
+          <a:lstStyle/>
+          <a:p>
+            <a:r>
+              <a:rPr lang="es-AR" sz="1700" dirty="0" smtClean="0">
+                <a:latin typeface="Corbel" pitchFamily="34" charset="0"/>
+              </a:rPr>
+              <a:t>Resultado de cada ciclo</a:t>
+            </a:r>
+            <a:endParaRPr lang="es-AR" sz="1700" dirty="0">
+              <a:latin typeface="Corbel" pitchFamily="34" charset="0"/>
+            </a:endParaRPr>
+          </a:p>
+        </p:txBody>
+      </p:sp>
+      <p:graphicFrame>
+        <p:nvGraphicFramePr>
+          <p:cNvPr id="13" name="12 Tabla"/>
+          <p:cNvGraphicFramePr>
+            <a:graphicFrameLocks noGrp="1"/>
+          </p:cNvGraphicFramePr>
+          <p:nvPr/>
+        </p:nvGraphicFramePr>
+        <p:xfrm>
+          <a:off x="12219729" y="4714884"/>
+          <a:ext cx="3172414" cy="1462527"/>
+        </p:xfrm>
+        <a:graphic>
+          <a:graphicData uri="http://schemas.openxmlformats.org/drawingml/2006/table">
+            <a:tbl>
+              <a:tblPr/>
+              <a:tblGrid>
+                <a:gridCol w="747619"/>
+                <a:gridCol w="1179630"/>
+                <a:gridCol w="1245165"/>
+              </a:tblGrid>
+              <a:tr h="418332">
+                <a:tc>
+                  <a:txBody>
+                    <a:bodyPr/>
+                    <a:lstStyle/>
+                    <a:p>
+                      <a:pPr algn="ctr" fontAlgn="ctr"/>
+                      <a:r>
+                        <a:rPr lang="es-AR" sz="1200" b="1" i="0" u="none" strike="noStrike" dirty="0" smtClean="0">
+                          <a:solidFill>
+                            <a:srgbClr val="000000"/>
+                          </a:solidFill>
+                          <a:latin typeface="+mj-lt"/>
+                        </a:rPr>
+                        <a:t>Ciclo</a:t>
+                      </a:r>
+                      <a:endParaRPr lang="es-AR" sz="1200" b="1" i="0" u="none" strike="noStrike" dirty="0">
+                        <a:solidFill>
+                          <a:srgbClr val="000000"/>
+                        </a:solidFill>
+                        <a:latin typeface="+mj-lt"/>
+                      </a:endParaRPr>
+                    </a:p>
+                  </a:txBody>
+                  <a:tcPr marL="9525" marR="9525" marT="9525" marB="0" anchor="ctr">
+                    <a:lnL w="12700" cap="flat" cmpd="sng" algn="ctr">
+                      <a:solidFill>
+                        <a:srgbClr val="000000"/>
+                      </a:solidFill>
+                      <a:prstDash val="solid"/>
+                      <a:round/>
+                      <a:headEnd type="none" w="med" len="med"/>
+                      <a:tailEnd type="none" w="med" len="med"/>
+                    </a:lnL>
+                    <a:lnR w="6350" cap="flat" cmpd="sng" algn="ctr">
+                      <a:solidFill>
+                        <a:srgbClr val="000000"/>
+                      </a:solidFill>
+                      <a:prstDash val="solid"/>
+                      <a:round/>
+                      <a:headEnd type="none" w="med" len="med"/>
+                      <a:tailEnd type="none" w="med" len="med"/>
+                    </a:lnR>
+                    <a:lnT w="12700" cap="flat" cmpd="sng" algn="ctr">
+                      <a:solidFill>
+                        <a:srgbClr val="000000"/>
+                      </a:solidFill>
+                      <a:prstDash val="solid"/>
+                      <a:round/>
+                      <a:headEnd type="none" w="med" len="med"/>
+                      <a:tailEnd type="none" w="med" len="med"/>
+                    </a:lnT>
+                    <a:lnB w="6350" cap="flat" cmpd="sng" algn="ctr">
+                      <a:solidFill>
+                        <a:srgbClr val="000000"/>
+                      </a:solidFill>
+                      <a:prstDash val="solid"/>
+                      <a:round/>
+                      <a:headEnd type="none" w="med" len="med"/>
+                      <a:tailEnd type="none" w="med" len="med"/>
+                    </a:lnB>
+                    <a:solidFill>
+                      <a:srgbClr val="F79646"/>
+                    </a:solidFill>
+                  </a:tcPr>
+                </a:tc>
+                <a:tc>
+                  <a:txBody>
+                    <a:bodyPr/>
+                    <a:lstStyle/>
+                    <a:p>
+                      <a:pPr algn="ctr" fontAlgn="ctr"/>
+                      <a:r>
+                        <a:rPr lang="es-AR" sz="1200" b="1" i="0" u="none" strike="noStrike" dirty="0">
+                          <a:solidFill>
+                            <a:srgbClr val="000000"/>
+                          </a:solidFill>
+                          <a:latin typeface="+mj-lt"/>
+                        </a:rPr>
+                        <a:t>Fecha de</a:t>
+                      </a:r>
+                      <a:br>
+                        <a:rPr lang="es-AR" sz="1200" b="1" i="0" u="none" strike="noStrike" dirty="0">
+                          <a:solidFill>
+                            <a:srgbClr val="000000"/>
+                          </a:solidFill>
+                          <a:latin typeface="+mj-lt"/>
+                        </a:rPr>
+                      </a:br>
+                      <a:r>
+                        <a:rPr lang="es-AR" sz="1200" b="1" i="0" u="none" strike="noStrike" dirty="0">
+                          <a:solidFill>
+                            <a:srgbClr val="000000"/>
+                          </a:solidFill>
+                          <a:latin typeface="+mj-lt"/>
+                        </a:rPr>
+                        <a:t>Prueba</a:t>
+                      </a:r>
+                    </a:p>
+                  </a:txBody>
+                  <a:tcPr marL="9525" marR="9525" marT="9525" marB="0" anchor="ctr">
+                    <a:lnL w="6350" cap="flat" cmpd="sng" algn="ctr">
+                      <a:solidFill>
+                        <a:srgbClr val="000000"/>
+                      </a:solidFill>
+                      <a:prstDash val="solid"/>
+                      <a:round/>
+                      <a:headEnd type="none" w="med" len="med"/>
+                      <a:tailEnd type="none" w="med" len="med"/>
+                    </a:lnL>
+                    <a:lnR w="6350" cap="flat" cmpd="sng" algn="ctr">
+                      <a:solidFill>
+                        <a:srgbClr val="000000"/>
+                      </a:solidFill>
+                      <a:prstDash val="solid"/>
+                      <a:round/>
+                      <a:headEnd type="none" w="med" len="med"/>
+                      <a:tailEnd type="none" w="med" len="med"/>
+                    </a:lnR>
+                    <a:lnT w="12700" cap="flat" cmpd="sng" algn="ctr">
+                      <a:solidFill>
+                        <a:srgbClr val="000000"/>
+                      </a:solidFill>
+                      <a:prstDash val="solid"/>
+                      <a:round/>
+                      <a:headEnd type="none" w="med" len="med"/>
+                      <a:tailEnd type="none" w="med" len="med"/>
+                    </a:lnT>
+                    <a:lnB w="6350" cap="flat" cmpd="sng" algn="ctr">
+                      <a:solidFill>
+                        <a:srgbClr val="000000"/>
+                      </a:solidFill>
+                      <a:prstDash val="solid"/>
+                      <a:round/>
+                      <a:headEnd type="none" w="med" len="med"/>
+                      <a:tailEnd type="none" w="med" len="med"/>
+                    </a:lnB>
+                    <a:solidFill>
+                      <a:srgbClr val="F79646"/>
+                    </a:solidFill>
+                  </a:tcPr>
+                </a:tc>
+                <a:tc>
+                  <a:txBody>
+                    <a:bodyPr/>
+                    <a:lstStyle/>
+                    <a:p>
+                      <a:pPr algn="ctr" fontAlgn="ctr"/>
+                      <a:r>
+                        <a:rPr lang="es-AR" sz="1200" b="1" i="0" u="none" strike="noStrike" dirty="0">
+                          <a:solidFill>
+                            <a:srgbClr val="000000"/>
+                          </a:solidFill>
+                          <a:latin typeface="+mj-lt"/>
+                        </a:rPr>
+                        <a:t>Resultado</a:t>
+                      </a:r>
+                    </a:p>
+                  </a:txBody>
+                  <a:tcPr marL="9525" marR="9525" marT="9525" marB="0" anchor="ctr">
+                    <a:lnL w="6350" cap="flat" cmpd="sng" algn="ctr">
+                      <a:solidFill>
+                        <a:srgbClr val="000000"/>
+                      </a:solidFill>
+                      <a:prstDash val="solid"/>
+                      <a:round/>
+                      <a:headEnd type="none" w="med" len="med"/>
+                      <a:tailEnd type="none" w="med" len="med"/>
+                    </a:lnL>
+                    <a:lnR w="12700" cap="flat" cmpd="sng" algn="ctr">
+                      <a:solidFill>
+                        <a:srgbClr val="000000"/>
+                      </a:solidFill>
+                      <a:prstDash val="solid"/>
+                      <a:round/>
+                      <a:headEnd type="none" w="med" len="med"/>
+                      <a:tailEnd type="none" w="med" len="med"/>
+                    </a:lnR>
+                    <a:lnT w="12700" cap="flat" cmpd="sng" algn="ctr">
+                      <a:solidFill>
+                        <a:srgbClr val="000000"/>
+                      </a:solidFill>
+                      <a:prstDash val="solid"/>
+                      <a:round/>
+                      <a:headEnd type="none" w="med" len="med"/>
+                      <a:tailEnd type="none" w="med" len="med"/>
+                    </a:lnT>
+                    <a:lnB w="6350" cap="flat" cmpd="sng" algn="ctr">
+                      <a:solidFill>
+                        <a:srgbClr val="000000"/>
+                      </a:solidFill>
+                      <a:prstDash val="solid"/>
+                      <a:round/>
+                      <a:headEnd type="none" w="med" len="med"/>
+                      <a:tailEnd type="none" w="med" len="med"/>
+                    </a:lnB>
+                    <a:solidFill>
+                      <a:srgbClr val="F79646"/>
+                    </a:solidFill>
+                  </a:tcPr>
+                </a:tc>
+              </a:tr>
+              <a:tr h="257826">
+                <a:tc>
+                  <a:txBody>
+                    <a:bodyPr/>
+                    <a:lstStyle/>
+                    <a:p>
+                      <a:pPr algn="ctr" fontAlgn="b"/>
+                      <a:r>
+                        <a:rPr kumimoji="0" lang="es-AR" sz="1200" kern="1200" dirty="0" smtClean="0">
+                          <a:solidFill>
+                            <a:schemeClr val="dk1"/>
+                          </a:solidFill>
+                          <a:latin typeface="+mn-lt"/>
+                          <a:ea typeface="+mn-ea"/>
+                          <a:cs typeface="+mn-cs"/>
+                        </a:rPr>
+                        <a:t>1</a:t>
+                      </a:r>
+                      <a:endParaRPr kumimoji="0" lang="es-AR" sz="1200" kern="1200" dirty="0">
+                        <a:solidFill>
+                          <a:schemeClr val="dk1"/>
+                        </a:solidFill>
+                        <a:latin typeface="+mn-lt"/>
+                        <a:ea typeface="+mn-ea"/>
+                        <a:cs typeface="+mn-cs"/>
+                      </a:endParaRPr>
+                    </a:p>
+                  </a:txBody>
+                  <a:tcPr marL="9525" marR="9525" marT="9525" marB="0" anchor="b">
+                    <a:lnL w="12700" cap="flat" cmpd="sng" algn="ctr">
+                      <a:solidFill>
+                        <a:srgbClr val="000000"/>
+                      </a:solidFill>
+                      <a:prstDash val="solid"/>
+                      <a:round/>
+                      <a:headEnd type="none" w="med" len="med"/>
+                      <a:tailEnd type="none" w="med" len="med"/>
+                    </a:lnL>
+                    <a:lnR>
+                      <a:noFill/>
+                    </a:lnR>
+                    <a:lnT w="6350" cap="flat" cmpd="sng" algn="ctr">
+                      <a:solidFill>
+                        <a:srgbClr val="000000"/>
+                      </a:solidFill>
+                      <a:prstDash val="solid"/>
+                      <a:round/>
+                      <a:headEnd type="none" w="med" len="med"/>
+                      <a:tailEnd type="none" w="med" len="med"/>
+                    </a:lnT>
+                    <a:lnB w="6350" cap="flat" cmpd="sng" algn="ctr">
+                      <a:solidFill>
+                        <a:srgbClr val="000000"/>
+                      </a:solidFill>
+                      <a:prstDash val="solid"/>
+                      <a:round/>
+                      <a:headEnd type="none" w="med" len="med"/>
+                      <a:tailEnd type="none" w="med" len="med"/>
+                    </a:lnB>
+                  </a:tcPr>
+                </a:tc>
+                <a:tc>
+                  <a:txBody>
+                    <a:bodyPr/>
+                    <a:lstStyle/>
+                    <a:p>
+                      <a:pPr algn="ctr" fontAlgn="b"/>
+                      <a:r>
+                        <a:rPr kumimoji="0" lang="es-AR" sz="1200" kern="1200" dirty="0">
+                          <a:solidFill>
+                            <a:schemeClr val="dk1"/>
+                          </a:solidFill>
+                          <a:latin typeface="+mn-lt"/>
+                          <a:ea typeface="+mn-ea"/>
+                          <a:cs typeface="+mn-cs"/>
+                        </a:rPr>
+                        <a:t>16/11/2010</a:t>
+                      </a:r>
+                    </a:p>
+                  </a:txBody>
+                  <a:tcPr marL="9525" marR="9525" marT="9525" marB="0" anchor="b">
+                    <a:lnL>
+                      <a:noFill/>
+                    </a:lnL>
+                    <a:lnR>
+                      <a:noFill/>
+                    </a:lnR>
+                    <a:lnT w="6350" cap="flat" cmpd="sng" algn="ctr">
+                      <a:solidFill>
+                        <a:srgbClr val="000000"/>
+                      </a:solidFill>
+                      <a:prstDash val="solid"/>
+                      <a:round/>
+                      <a:headEnd type="none" w="med" len="med"/>
+                      <a:tailEnd type="none" w="med" len="med"/>
+                    </a:lnT>
+                    <a:lnB w="6350" cap="flat" cmpd="sng" algn="ctr">
+                      <a:solidFill>
+                        <a:srgbClr val="000000"/>
+                      </a:solidFill>
+                      <a:prstDash val="solid"/>
+                      <a:round/>
+                      <a:headEnd type="none" w="med" len="med"/>
+                      <a:tailEnd type="none" w="med" len="med"/>
+                    </a:lnB>
+                  </a:tcPr>
+                </a:tc>
+                <a:tc>
+                  <a:txBody>
+                    <a:bodyPr/>
+                    <a:lstStyle/>
+                    <a:p>
+                      <a:pPr algn="ctr" fontAlgn="b"/>
+                      <a:r>
+                        <a:rPr kumimoji="0" lang="es-AR" sz="1200" kern="1200" dirty="0" smtClean="0">
+                          <a:solidFill>
+                            <a:schemeClr val="dk1"/>
+                          </a:solidFill>
+                          <a:latin typeface="+mn-lt"/>
+                          <a:ea typeface="+mn-ea"/>
+                          <a:cs typeface="+mn-cs"/>
+                        </a:rPr>
+                        <a:t>Rechazada</a:t>
+                      </a:r>
+                      <a:endParaRPr kumimoji="0" lang="es-AR" sz="1200" kern="1200" dirty="0">
+                        <a:solidFill>
+                          <a:schemeClr val="dk1"/>
+                        </a:solidFill>
+                        <a:latin typeface="+mn-lt"/>
+                        <a:ea typeface="+mn-ea"/>
+                        <a:cs typeface="+mn-cs"/>
+                      </a:endParaRPr>
+                    </a:p>
+                  </a:txBody>
+                  <a:tcPr marL="9525" marR="9525" marT="9525" marB="0" anchor="b">
+                    <a:lnL>
+                      <a:noFill/>
+                    </a:lnL>
+                    <a:lnR w="12700" cap="flat" cmpd="sng" algn="ctr">
+                      <a:solidFill>
+                        <a:srgbClr val="000000"/>
+                      </a:solidFill>
+                      <a:prstDash val="solid"/>
+                      <a:round/>
+                      <a:headEnd type="none" w="med" len="med"/>
+                      <a:tailEnd type="none" w="med" len="med"/>
+                    </a:lnR>
+                    <a:lnT w="6350" cap="flat" cmpd="sng" algn="ctr">
+                      <a:solidFill>
+                        <a:srgbClr val="000000"/>
+                      </a:solidFill>
+                      <a:prstDash val="solid"/>
+                      <a:round/>
+                      <a:headEnd type="none" w="med" len="med"/>
+                      <a:tailEnd type="none" w="med" len="med"/>
+                    </a:lnT>
+                    <a:lnB w="6350" cap="flat" cmpd="sng" algn="ctr">
+                      <a:solidFill>
+                        <a:srgbClr val="000000"/>
+                      </a:solidFill>
+                      <a:prstDash val="solid"/>
+                      <a:round/>
+                      <a:headEnd type="none" w="med" len="med"/>
+                      <a:tailEnd type="none" w="med" len="med"/>
+                    </a:lnB>
+                  </a:tcPr>
+                </a:tc>
+              </a:tr>
+              <a:tr h="257826">
+                <a:tc>
+                  <a:txBody>
+                    <a:bodyPr/>
+                    <a:lstStyle/>
+                    <a:p>
+                      <a:pPr algn="ctr" fontAlgn="b"/>
+                      <a:r>
+                        <a:rPr kumimoji="0" lang="es-AR" sz="1200" kern="1200" dirty="0" smtClean="0">
+                          <a:solidFill>
+                            <a:schemeClr val="dk1"/>
+                          </a:solidFill>
+                          <a:latin typeface="+mn-lt"/>
+                          <a:ea typeface="+mn-ea"/>
+                          <a:cs typeface="+mn-cs"/>
+                        </a:rPr>
+                        <a:t>2</a:t>
+                      </a:r>
+                      <a:endParaRPr kumimoji="0" lang="es-AR" sz="1200" kern="1200" dirty="0">
+                        <a:solidFill>
+                          <a:schemeClr val="dk1"/>
+                        </a:solidFill>
+                        <a:latin typeface="+mn-lt"/>
+                        <a:ea typeface="+mn-ea"/>
+                        <a:cs typeface="+mn-cs"/>
+                      </a:endParaRPr>
+                    </a:p>
+                  </a:txBody>
+                  <a:tcPr marL="9525" marR="9525" marT="9525" marB="0" anchor="b">
+                    <a:lnL w="12700" cap="flat" cmpd="sng" algn="ctr">
+                      <a:solidFill>
+                        <a:srgbClr val="000000"/>
+                      </a:solidFill>
+                      <a:prstDash val="solid"/>
+                      <a:round/>
+                      <a:headEnd type="none" w="med" len="med"/>
+                      <a:tailEnd type="none" w="med" len="med"/>
+                    </a:lnL>
+                    <a:lnR>
+                      <a:noFill/>
+                    </a:lnR>
+                    <a:lnT w="6350" cap="flat" cmpd="sng" algn="ctr">
+                      <a:solidFill>
+                        <a:srgbClr val="000000"/>
+                      </a:solidFill>
+                      <a:prstDash val="solid"/>
+                      <a:round/>
+                      <a:headEnd type="none" w="med" len="med"/>
+                      <a:tailEnd type="none" w="med" len="med"/>
+                    </a:lnT>
+                    <a:lnB w="6350" cap="flat" cmpd="sng" algn="ctr">
+                      <a:solidFill>
+                        <a:srgbClr val="000000"/>
+                      </a:solidFill>
+                      <a:prstDash val="solid"/>
+                      <a:round/>
+                      <a:headEnd type="none" w="med" len="med"/>
+                      <a:tailEnd type="none" w="med" len="med"/>
+                    </a:lnB>
+                  </a:tcPr>
+                </a:tc>
+                <a:tc>
+                  <a:txBody>
+                    <a:bodyPr/>
+                    <a:lstStyle/>
+                    <a:p>
+                      <a:pPr algn="ctr" fontAlgn="b"/>
+                      <a:r>
+                        <a:rPr kumimoji="0" lang="es-AR" sz="1200" kern="1200" dirty="0">
+                          <a:solidFill>
+                            <a:schemeClr val="dk1"/>
+                          </a:solidFill>
+                          <a:latin typeface="+mn-lt"/>
+                          <a:ea typeface="+mn-ea"/>
+                          <a:cs typeface="+mn-cs"/>
+                        </a:rPr>
+                        <a:t>21/01/2011</a:t>
+                      </a:r>
+                    </a:p>
+                  </a:txBody>
+                  <a:tcPr marL="9525" marR="9525" marT="9525" marB="0" anchor="b">
+                    <a:lnL>
+                      <a:noFill/>
+                    </a:lnL>
+                    <a:lnR>
+                      <a:noFill/>
+                    </a:lnR>
+                    <a:lnT w="6350" cap="flat" cmpd="sng" algn="ctr">
+                      <a:solidFill>
+                        <a:srgbClr val="000000"/>
+                      </a:solidFill>
+                      <a:prstDash val="solid"/>
+                      <a:round/>
+                      <a:headEnd type="none" w="med" len="med"/>
+                      <a:tailEnd type="none" w="med" len="med"/>
+                    </a:lnT>
+                    <a:lnB w="6350" cap="flat" cmpd="sng" algn="ctr">
+                      <a:solidFill>
+                        <a:srgbClr val="000000"/>
+                      </a:solidFill>
+                      <a:prstDash val="solid"/>
+                      <a:round/>
+                      <a:headEnd type="none" w="med" len="med"/>
+                      <a:tailEnd type="none" w="med" len="med"/>
+                    </a:lnB>
+                  </a:tcPr>
+                </a:tc>
+                <a:tc>
+                  <a:txBody>
+                    <a:bodyPr/>
+                    <a:lstStyle/>
+                    <a:p>
+                      <a:pPr algn="ctr" fontAlgn="b"/>
+                      <a:r>
+                        <a:rPr kumimoji="0" lang="es-AR" sz="1200" kern="1200" dirty="0" smtClean="0">
+                          <a:solidFill>
+                            <a:schemeClr val="dk1"/>
+                          </a:solidFill>
+                          <a:latin typeface="+mn-lt"/>
+                          <a:ea typeface="+mn-ea"/>
+                          <a:cs typeface="+mn-cs"/>
+                        </a:rPr>
+                        <a:t>Rechazada</a:t>
+                      </a:r>
+                      <a:endParaRPr kumimoji="0" lang="es-AR" sz="1200" kern="1200" dirty="0">
+                        <a:solidFill>
+                          <a:schemeClr val="dk1"/>
+                        </a:solidFill>
+                        <a:latin typeface="+mn-lt"/>
+                        <a:ea typeface="+mn-ea"/>
+                        <a:cs typeface="+mn-cs"/>
+                      </a:endParaRPr>
+                    </a:p>
+                  </a:txBody>
+                  <a:tcPr marL="9525" marR="9525" marT="9525" marB="0" anchor="b">
+                    <a:lnL>
+                      <a:noFill/>
+                    </a:lnL>
+                    <a:lnR w="12700" cap="flat" cmpd="sng" algn="ctr">
+                      <a:solidFill>
+                        <a:srgbClr val="000000"/>
+                      </a:solidFill>
+                      <a:prstDash val="solid"/>
+                      <a:round/>
+                      <a:headEnd type="none" w="med" len="med"/>
+                      <a:tailEnd type="none" w="med" len="med"/>
+                    </a:lnR>
+                    <a:lnT w="6350" cap="flat" cmpd="sng" algn="ctr">
+                      <a:solidFill>
+                        <a:srgbClr val="000000"/>
+                      </a:solidFill>
+                      <a:prstDash val="solid"/>
+                      <a:round/>
+                      <a:headEnd type="none" w="med" len="med"/>
+                      <a:tailEnd type="none" w="med" len="med"/>
+                    </a:lnT>
+                    <a:lnB w="6350" cap="flat" cmpd="sng" algn="ctr">
+                      <a:solidFill>
+                        <a:srgbClr val="000000"/>
+                      </a:solidFill>
+                      <a:prstDash val="solid"/>
+                      <a:round/>
+                      <a:headEnd type="none" w="med" len="med"/>
+                      <a:tailEnd type="none" w="med" len="med"/>
+                    </a:lnB>
+                  </a:tcPr>
+                </a:tc>
+              </a:tr>
+              <a:tr h="257826">
+                <a:tc>
+                  <a:txBody>
+                    <a:bodyPr/>
+                    <a:lstStyle/>
+                    <a:p>
+                      <a:pPr algn="ctr" fontAlgn="b"/>
+                      <a:r>
+                        <a:rPr kumimoji="0" lang="es-AR" sz="1200" kern="1200" dirty="0" smtClean="0">
+                          <a:solidFill>
+                            <a:schemeClr val="dk1"/>
+                          </a:solidFill>
+                          <a:latin typeface="+mn-lt"/>
+                          <a:ea typeface="+mn-ea"/>
+                          <a:cs typeface="+mn-cs"/>
+                        </a:rPr>
+                        <a:t>3</a:t>
+                      </a:r>
+                      <a:endParaRPr kumimoji="0" lang="es-AR" sz="1200" kern="1200" dirty="0">
+                        <a:solidFill>
+                          <a:schemeClr val="dk1"/>
+                        </a:solidFill>
+                        <a:latin typeface="+mn-lt"/>
+                        <a:ea typeface="+mn-ea"/>
+                        <a:cs typeface="+mn-cs"/>
+                      </a:endParaRPr>
+                    </a:p>
+                  </a:txBody>
+                  <a:tcPr marL="9525" marR="9525" marT="9525" marB="0" anchor="b">
+                    <a:lnL w="12700" cap="flat" cmpd="sng" algn="ctr">
+                      <a:solidFill>
+                        <a:srgbClr val="000000"/>
+                      </a:solidFill>
+                      <a:prstDash val="solid"/>
+                      <a:round/>
+                      <a:headEnd type="none" w="med" len="med"/>
+                      <a:tailEnd type="none" w="med" len="med"/>
+                    </a:lnL>
+                    <a:lnR>
+                      <a:noFill/>
+                    </a:lnR>
+                    <a:lnT w="6350" cap="flat" cmpd="sng" algn="ctr">
+                      <a:solidFill>
+                        <a:srgbClr val="000000"/>
+                      </a:solidFill>
+                      <a:prstDash val="solid"/>
+                      <a:round/>
+                      <a:headEnd type="none" w="med" len="med"/>
+                      <a:tailEnd type="none" w="med" len="med"/>
+                    </a:lnT>
+                    <a:lnB w="6350" cap="flat" cmpd="sng" algn="ctr">
+                      <a:solidFill>
+                        <a:srgbClr val="000000"/>
+                      </a:solidFill>
+                      <a:prstDash val="solid"/>
+                      <a:round/>
+                      <a:headEnd type="none" w="med" len="med"/>
+                      <a:tailEnd type="none" w="med" len="med"/>
+                    </a:lnB>
+                  </a:tcPr>
+                </a:tc>
+                <a:tc>
+                  <a:txBody>
+                    <a:bodyPr/>
+                    <a:lstStyle/>
+                    <a:p>
+                      <a:pPr algn="ctr" fontAlgn="b"/>
+                      <a:r>
+                        <a:rPr kumimoji="0" lang="es-AR" sz="1200" kern="1200" dirty="0">
+                          <a:solidFill>
+                            <a:schemeClr val="dk1"/>
+                          </a:solidFill>
+                          <a:latin typeface="+mn-lt"/>
+                          <a:ea typeface="+mn-ea"/>
+                          <a:cs typeface="+mn-cs"/>
+                        </a:rPr>
+                        <a:t>12/03/2011</a:t>
+                      </a:r>
+                    </a:p>
+                  </a:txBody>
+                  <a:tcPr marL="9525" marR="9525" marT="9525" marB="0" anchor="b">
+                    <a:lnL>
+                      <a:noFill/>
+                    </a:lnL>
+                    <a:lnR>
+                      <a:noFill/>
+                    </a:lnR>
+                    <a:lnT w="6350" cap="flat" cmpd="sng" algn="ctr">
+                      <a:solidFill>
+                        <a:srgbClr val="000000"/>
+                      </a:solidFill>
+                      <a:prstDash val="solid"/>
+                      <a:round/>
+                      <a:headEnd type="none" w="med" len="med"/>
+                      <a:tailEnd type="none" w="med" len="med"/>
+                    </a:lnT>
+                    <a:lnB w="6350" cap="flat" cmpd="sng" algn="ctr">
+                      <a:solidFill>
+                        <a:srgbClr val="000000"/>
+                      </a:solidFill>
+                      <a:prstDash val="solid"/>
+                      <a:round/>
+                      <a:headEnd type="none" w="med" len="med"/>
+                      <a:tailEnd type="none" w="med" len="med"/>
+                    </a:lnB>
+                  </a:tcPr>
+                </a:tc>
+                <a:tc>
+                  <a:txBody>
+                    <a:bodyPr/>
+                    <a:lstStyle/>
+                    <a:p>
+                      <a:pPr algn="ctr" fontAlgn="b"/>
+                      <a:r>
+                        <a:rPr kumimoji="0" lang="es-AR" sz="1200" kern="1200" dirty="0" smtClean="0">
+                          <a:solidFill>
+                            <a:schemeClr val="dk1"/>
+                          </a:solidFill>
+                          <a:latin typeface="+mn-lt"/>
+                          <a:ea typeface="+mn-ea"/>
+                          <a:cs typeface="+mn-cs"/>
+                        </a:rPr>
+                        <a:t>Rechazada</a:t>
+                      </a:r>
+                      <a:endParaRPr kumimoji="0" lang="es-AR" sz="1200" kern="1200" dirty="0">
+                        <a:solidFill>
+                          <a:schemeClr val="dk1"/>
+                        </a:solidFill>
+                        <a:latin typeface="+mn-lt"/>
+                        <a:ea typeface="+mn-ea"/>
+                        <a:cs typeface="+mn-cs"/>
+                      </a:endParaRPr>
+                    </a:p>
+                  </a:txBody>
+                  <a:tcPr marL="9525" marR="9525" marT="9525" marB="0" anchor="b">
+                    <a:lnL>
+                      <a:noFill/>
+                    </a:lnL>
+                    <a:lnR w="12700" cap="flat" cmpd="sng" algn="ctr">
+                      <a:solidFill>
+                        <a:srgbClr val="000000"/>
+                      </a:solidFill>
+                      <a:prstDash val="solid"/>
+                      <a:round/>
+                      <a:headEnd type="none" w="med" len="med"/>
+                      <a:tailEnd type="none" w="med" len="med"/>
+                    </a:lnR>
+                    <a:lnT w="6350" cap="flat" cmpd="sng" algn="ctr">
+                      <a:solidFill>
+                        <a:srgbClr val="000000"/>
+                      </a:solidFill>
+                      <a:prstDash val="solid"/>
+                      <a:round/>
+                      <a:headEnd type="none" w="med" len="med"/>
+                      <a:tailEnd type="none" w="med" len="med"/>
+                    </a:lnT>
+                    <a:lnB w="6350" cap="flat" cmpd="sng" algn="ctr">
+                      <a:solidFill>
+                        <a:srgbClr val="000000"/>
+                      </a:solidFill>
+                      <a:prstDash val="solid"/>
+                      <a:round/>
+                      <a:headEnd type="none" w="med" len="med"/>
+                      <a:tailEnd type="none" w="med" len="med"/>
+                    </a:lnB>
+                  </a:tcPr>
+                </a:tc>
+              </a:tr>
+              <a:tr h="270717">
+                <a:tc>
+                  <a:txBody>
+                    <a:bodyPr/>
+                    <a:lstStyle/>
+                    <a:p>
+                      <a:pPr algn="ctr" fontAlgn="b"/>
+                      <a:r>
+                        <a:rPr kumimoji="0" lang="es-AR" sz="1200" kern="1200" dirty="0" smtClean="0">
+                          <a:solidFill>
+                            <a:schemeClr val="dk1"/>
+                          </a:solidFill>
+                          <a:latin typeface="+mn-lt"/>
+                          <a:ea typeface="+mn-ea"/>
+                          <a:cs typeface="+mn-cs"/>
+                        </a:rPr>
+                        <a:t>4</a:t>
+                      </a:r>
+                      <a:endParaRPr kumimoji="0" lang="es-AR" sz="1200" kern="1200" dirty="0">
+                        <a:solidFill>
+                          <a:schemeClr val="dk1"/>
+                        </a:solidFill>
+                        <a:latin typeface="+mn-lt"/>
+                        <a:ea typeface="+mn-ea"/>
+                        <a:cs typeface="+mn-cs"/>
+                      </a:endParaRPr>
+                    </a:p>
+                  </a:txBody>
+                  <a:tcPr marL="9525" marR="9525" marT="9525" marB="0" anchor="b">
+                    <a:lnL w="12700" cap="flat" cmpd="sng" algn="ctr">
+                      <a:solidFill>
+                        <a:srgbClr val="000000"/>
+                      </a:solidFill>
+                      <a:prstDash val="solid"/>
+                      <a:round/>
+                      <a:headEnd type="none" w="med" len="med"/>
+                      <a:tailEnd type="none" w="med" len="med"/>
+                    </a:lnL>
+                    <a:lnR>
+                      <a:noFill/>
+                    </a:lnR>
+                    <a:lnT w="6350" cap="flat" cmpd="sng" algn="ctr">
+                      <a:solidFill>
+                        <a:srgbClr val="000000"/>
+                      </a:solidFill>
+                      <a:prstDash val="solid"/>
+                      <a:round/>
+                      <a:headEnd type="none" w="med" len="med"/>
+                      <a:tailEnd type="none" w="med" len="med"/>
+                    </a:lnT>
+                    <a:lnB w="12700" cap="flat" cmpd="sng" algn="ctr">
+                      <a:solidFill>
+                        <a:srgbClr val="000000"/>
+                      </a:solidFill>
+                      <a:prstDash val="solid"/>
+                      <a:round/>
+                      <a:headEnd type="none" w="med" len="med"/>
+                      <a:tailEnd type="none" w="med" len="med"/>
+                    </a:lnB>
+                  </a:tcPr>
+                </a:tc>
+                <a:tc>
+                  <a:txBody>
+                    <a:bodyPr/>
+                    <a:lstStyle/>
+                    <a:p>
+                      <a:pPr algn="ctr" fontAlgn="b"/>
+                      <a:r>
+                        <a:rPr kumimoji="0" lang="es-AR" sz="1200" kern="1200" dirty="0">
+                          <a:solidFill>
+                            <a:schemeClr val="dk1"/>
+                          </a:solidFill>
+                          <a:latin typeface="+mn-lt"/>
+                          <a:ea typeface="+mn-ea"/>
+                          <a:cs typeface="+mn-cs"/>
+                        </a:rPr>
+                        <a:t>08/04/2011</a:t>
+                      </a:r>
+                    </a:p>
+                  </a:txBody>
+                  <a:tcPr marL="9525" marR="9525" marT="9525" marB="0" anchor="b">
+                    <a:lnL>
+                      <a:noFill/>
+                    </a:lnL>
+                    <a:lnR>
+                      <a:noFill/>
+                    </a:lnR>
+                    <a:lnT w="6350" cap="flat" cmpd="sng" algn="ctr">
+                      <a:solidFill>
+                        <a:srgbClr val="000000"/>
+                      </a:solidFill>
+                      <a:prstDash val="solid"/>
+                      <a:round/>
+                      <a:headEnd type="none" w="med" len="med"/>
+                      <a:tailEnd type="none" w="med" len="med"/>
+                    </a:lnT>
+                    <a:lnB w="12700" cap="flat" cmpd="sng" algn="ctr">
+                      <a:solidFill>
+                        <a:srgbClr val="000000"/>
+                      </a:solidFill>
+                      <a:prstDash val="solid"/>
+                      <a:round/>
+                      <a:headEnd type="none" w="med" len="med"/>
+                      <a:tailEnd type="none" w="med" len="med"/>
+                    </a:lnB>
+                  </a:tcPr>
+                </a:tc>
+                <a:tc>
+                  <a:txBody>
+                    <a:bodyPr/>
+                    <a:lstStyle/>
+                    <a:p>
+                      <a:pPr algn="ctr" fontAlgn="b"/>
+                      <a:r>
+                        <a:rPr kumimoji="0" lang="es-AR" sz="1200" kern="1200" dirty="0">
+                          <a:solidFill>
+                            <a:schemeClr val="dk1"/>
+                          </a:solidFill>
+                          <a:latin typeface="+mn-lt"/>
+                          <a:ea typeface="+mn-ea"/>
+                          <a:cs typeface="+mn-cs"/>
+                        </a:rPr>
+                        <a:t>Aceptada</a:t>
+                      </a:r>
+                    </a:p>
+                  </a:txBody>
+                  <a:tcPr marL="9525" marR="9525" marT="9525" marB="0" anchor="b">
+                    <a:lnL>
+                      <a:noFill/>
+                    </a:lnL>
+                    <a:lnR w="12700" cap="flat" cmpd="sng" algn="ctr">
+                      <a:solidFill>
+                        <a:srgbClr val="000000"/>
+                      </a:solidFill>
+                      <a:prstDash val="solid"/>
+                      <a:round/>
+                      <a:headEnd type="none" w="med" len="med"/>
+                      <a:tailEnd type="none" w="med" len="med"/>
+                    </a:lnR>
+                    <a:lnT w="6350" cap="flat" cmpd="sng" algn="ctr">
+                      <a:solidFill>
+                        <a:srgbClr val="000000"/>
+                      </a:solidFill>
+                      <a:prstDash val="solid"/>
+                      <a:round/>
+                      <a:headEnd type="none" w="med" len="med"/>
+                      <a:tailEnd type="none" w="med" len="med"/>
+                    </a:lnT>
+                    <a:lnB w="12700" cap="flat" cmpd="sng" algn="ctr">
+                      <a:solidFill>
+                        <a:srgbClr val="000000"/>
+                      </a:solidFill>
+                      <a:prstDash val="solid"/>
+                      <a:round/>
+                      <a:headEnd type="none" w="med" len="med"/>
+                      <a:tailEnd type="none" w="med" len="med"/>
+                    </a:lnB>
+                  </a:tcPr>
+                </a:tc>
+              </a:tr>
+            </a:tbl>
+          </a:graphicData>
+        </a:graphic>
+      </p:graphicFrame>
+      <p:graphicFrame>
+        <p:nvGraphicFramePr>
+          <p:cNvPr id="16" name="15 Tabla"/>
+          <p:cNvGraphicFramePr>
+            <a:graphicFrameLocks noGrp="1"/>
+          </p:cNvGraphicFramePr>
+          <p:nvPr/>
+        </p:nvGraphicFramePr>
+        <p:xfrm>
+          <a:off x="12463185" y="2357430"/>
+          <a:ext cx="2643206" cy="857256"/>
+        </p:xfrm>
+        <a:graphic>
+          <a:graphicData uri="http://schemas.openxmlformats.org/drawingml/2006/table">
+            <a:tbl>
+              <a:tblPr firstRow="1" bandRow="1">
+                <a:tableStyleId>{22838BEF-8BB2-4498-84A7-C5851F593DF1}</a:tableStyleId>
+              </a:tblPr>
+              <a:tblGrid>
+                <a:gridCol w="1384536"/>
+                <a:gridCol w="667195"/>
+                <a:gridCol w="591475"/>
+              </a:tblGrid>
+              <a:tr h="285752">
+                <a:tc>
+                  <a:txBody>
+                    <a:bodyPr/>
+                    <a:lstStyle/>
+                    <a:p>
+                      <a:r>
+                        <a:rPr lang="es-AR" sz="1200" b="0" dirty="0" smtClean="0"/>
+                        <a:t>Incidentes</a:t>
+                      </a:r>
+                      <a:r>
+                        <a:rPr lang="es-AR" sz="1200" b="0" baseline="0" dirty="0" smtClean="0"/>
+                        <a:t> A</a:t>
+                      </a:r>
+                      <a:endParaRPr lang="es-AR" sz="1200" b="0" dirty="0"/>
+                    </a:p>
+                  </a:txBody>
+                  <a:tcPr/>
+                </a:tc>
+                <a:tc>
+                  <a:txBody>
+                    <a:bodyPr/>
+                    <a:lstStyle/>
+                    <a:p>
+                      <a:r>
+                        <a:rPr lang="es-AR" sz="1200" b="0" dirty="0" smtClean="0"/>
+                        <a:t>2%</a:t>
+                      </a:r>
+                      <a:endParaRPr lang="es-AR" sz="1200" b="0" dirty="0"/>
+                    </a:p>
+                  </a:txBody>
+                  <a:tcPr/>
+                </a:tc>
+                <a:tc>
+                  <a:txBody>
+                    <a:bodyPr/>
+                    <a:lstStyle/>
+                    <a:p>
+                      <a:r>
+                        <a:rPr lang="es-AR" sz="1200" b="0" dirty="0" smtClean="0"/>
+                        <a:t>8</a:t>
+                      </a:r>
+                      <a:endParaRPr lang="es-AR" sz="1200" b="0" dirty="0"/>
+                    </a:p>
+                  </a:txBody>
+                  <a:tcPr/>
+                </a:tc>
+              </a:tr>
+              <a:tr h="285752">
+                <a:tc>
+                  <a:txBody>
+                    <a:bodyPr/>
+                    <a:lstStyle/>
+                    <a:p>
+                      <a:r>
+                        <a:rPr lang="es-AR" sz="1200" dirty="0" smtClean="0"/>
+                        <a:t>Incidentes B</a:t>
+                      </a:r>
+                      <a:endParaRPr lang="es-AR" sz="1200" dirty="0"/>
+                    </a:p>
+                  </a:txBody>
+                  <a:tcPr/>
+                </a:tc>
+                <a:tc>
+                  <a:txBody>
+                    <a:bodyPr/>
+                    <a:lstStyle/>
+                    <a:p>
+                      <a:r>
+                        <a:rPr lang="es-AR" sz="1200" dirty="0" smtClean="0"/>
+                        <a:t>7%</a:t>
+                      </a:r>
+                      <a:endParaRPr lang="es-AR" sz="1200" dirty="0"/>
+                    </a:p>
+                  </a:txBody>
+                  <a:tcPr/>
+                </a:tc>
+                <a:tc>
+                  <a:txBody>
+                    <a:bodyPr/>
+                    <a:lstStyle/>
+                    <a:p>
+                      <a:r>
+                        <a:rPr lang="es-AR" sz="1200" dirty="0" smtClean="0"/>
+                        <a:t>27</a:t>
+                      </a:r>
+                      <a:endParaRPr lang="es-AR" sz="1200" dirty="0"/>
+                    </a:p>
+                  </a:txBody>
+                  <a:tcPr/>
+                </a:tc>
+              </a:tr>
+              <a:tr h="285752">
+                <a:tc>
+                  <a:txBody>
+                    <a:bodyPr/>
+                    <a:lstStyle/>
+                    <a:p>
+                      <a:r>
+                        <a:rPr lang="es-AR" sz="1200" dirty="0" smtClean="0"/>
+                        <a:t>Incidentes C</a:t>
+                      </a:r>
+                      <a:endParaRPr lang="es-AR" sz="1200" dirty="0"/>
+                    </a:p>
+                  </a:txBody>
+                  <a:tcPr/>
+                </a:tc>
+                <a:tc>
+                  <a:txBody>
+                    <a:bodyPr/>
+                    <a:lstStyle/>
+                    <a:p>
+                      <a:r>
+                        <a:rPr lang="es-AR" sz="1200" dirty="0" smtClean="0"/>
+                        <a:t>25%</a:t>
+                      </a:r>
+                      <a:endParaRPr lang="es-AR" sz="1200" dirty="0"/>
+                    </a:p>
+                  </a:txBody>
+                  <a:tcPr/>
+                </a:tc>
+                <a:tc>
+                  <a:txBody>
+                    <a:bodyPr/>
+                    <a:lstStyle/>
+                    <a:p>
+                      <a:r>
+                        <a:rPr lang="es-AR" sz="1200" dirty="0" smtClean="0"/>
+                        <a:t>96</a:t>
+                      </a:r>
+                      <a:endParaRPr lang="es-AR" sz="1200" dirty="0"/>
+                    </a:p>
+                  </a:txBody>
+                  <a:tcPr/>
+                </a:tc>
+              </a:tr>
+            </a:tbl>
+          </a:graphicData>
+        </a:graphic>
+      </p:graphicFrame>
+      <p:graphicFrame>
+        <p:nvGraphicFramePr>
+          <p:cNvPr id="17" name="16 Tabla"/>
+          <p:cNvGraphicFramePr>
+            <a:graphicFrameLocks noGrp="1"/>
+          </p:cNvGraphicFramePr>
+          <p:nvPr/>
+        </p:nvGraphicFramePr>
+        <p:xfrm>
+          <a:off x="12320309" y="3534734"/>
+          <a:ext cx="2643206" cy="822960"/>
+        </p:xfrm>
+        <a:graphic>
+          <a:graphicData uri="http://schemas.openxmlformats.org/drawingml/2006/table">
+            <a:tbl>
+              <a:tblPr firstRow="1" bandRow="1">
+                <a:tableStyleId>{22838BEF-8BB2-4498-84A7-C5851F593DF1}</a:tableStyleId>
+              </a:tblPr>
+              <a:tblGrid>
+                <a:gridCol w="1384536"/>
+                <a:gridCol w="667195"/>
+                <a:gridCol w="591475"/>
+              </a:tblGrid>
+              <a:tr h="261939">
+                <a:tc>
+                  <a:txBody>
+                    <a:bodyPr/>
+                    <a:lstStyle/>
+                    <a:p>
+                      <a:r>
+                        <a:rPr lang="es-AR" sz="1200" b="0" dirty="0" smtClean="0"/>
+                        <a:t>Incidentes</a:t>
+                      </a:r>
+                      <a:r>
+                        <a:rPr lang="es-AR" sz="1200" b="0" baseline="0" dirty="0" smtClean="0"/>
+                        <a:t> A</a:t>
+                      </a:r>
+                      <a:endParaRPr lang="es-AR" sz="1200" b="0" dirty="0"/>
+                    </a:p>
+                  </a:txBody>
+                  <a:tcPr/>
+                </a:tc>
+                <a:tc>
+                  <a:txBody>
+                    <a:bodyPr/>
+                    <a:lstStyle/>
+                    <a:p>
+                      <a:r>
+                        <a:rPr lang="es-AR" sz="1200" b="0" dirty="0" smtClean="0"/>
+                        <a:t>0%</a:t>
+                      </a:r>
+                      <a:endParaRPr lang="es-AR" sz="1200" b="0" dirty="0"/>
+                    </a:p>
+                  </a:txBody>
+                  <a:tcPr/>
+                </a:tc>
+                <a:tc>
+                  <a:txBody>
+                    <a:bodyPr/>
+                    <a:lstStyle/>
+                    <a:p>
+                      <a:r>
+                        <a:rPr lang="es-AR" sz="1200" b="0" dirty="0" smtClean="0"/>
+                        <a:t>0</a:t>
+                      </a:r>
+                      <a:endParaRPr lang="es-AR" sz="1200" b="0" dirty="0"/>
+                    </a:p>
+                  </a:txBody>
+                  <a:tcPr/>
+                </a:tc>
+              </a:tr>
+              <a:tr h="261939">
+                <a:tc>
+                  <a:txBody>
+                    <a:bodyPr/>
+                    <a:lstStyle/>
+                    <a:p>
+                      <a:r>
+                        <a:rPr lang="es-AR" sz="1200" dirty="0" smtClean="0"/>
+                        <a:t>Incidentes B</a:t>
+                      </a:r>
+                      <a:endParaRPr lang="es-AR" sz="1200" b="1" dirty="0"/>
+                    </a:p>
+                  </a:txBody>
+                  <a:tcPr/>
+                </a:tc>
+                <a:tc>
+                  <a:txBody>
+                    <a:bodyPr/>
+                    <a:lstStyle/>
+                    <a:p>
+                      <a:r>
+                        <a:rPr lang="es-AR" sz="1200" dirty="0" smtClean="0"/>
+                        <a:t>2%</a:t>
+                      </a:r>
+                      <a:endParaRPr lang="es-AR" sz="1200" dirty="0"/>
+                    </a:p>
+                  </a:txBody>
+                  <a:tcPr/>
+                </a:tc>
+                <a:tc>
+                  <a:txBody>
+                    <a:bodyPr/>
+                    <a:lstStyle/>
+                    <a:p>
+                      <a:r>
+                        <a:rPr lang="es-AR" sz="1200" dirty="0" smtClean="0"/>
+                        <a:t>8</a:t>
+                      </a:r>
+                      <a:endParaRPr lang="es-AR" sz="1200" dirty="0"/>
+                    </a:p>
+                  </a:txBody>
+                  <a:tcPr/>
+                </a:tc>
+              </a:tr>
+              <a:tr h="261939">
+                <a:tc>
+                  <a:txBody>
+                    <a:bodyPr/>
+                    <a:lstStyle/>
+                    <a:p>
+                      <a:r>
+                        <a:rPr lang="es-AR" sz="1200" dirty="0" smtClean="0"/>
+                        <a:t>Incidentes C</a:t>
+                      </a:r>
+                      <a:endParaRPr lang="es-AR" sz="1200" dirty="0"/>
+                    </a:p>
+                  </a:txBody>
+                  <a:tcPr/>
+                </a:tc>
+                <a:tc>
+                  <a:txBody>
+                    <a:bodyPr/>
+                    <a:lstStyle/>
+                    <a:p>
+                      <a:r>
+                        <a:rPr lang="es-AR" sz="1200" dirty="0" smtClean="0"/>
+                        <a:t>10%</a:t>
+                      </a:r>
+                      <a:endParaRPr lang="es-AR" sz="1200" dirty="0"/>
+                    </a:p>
+                  </a:txBody>
+                  <a:tcPr/>
+                </a:tc>
+                <a:tc>
+                  <a:txBody>
+                    <a:bodyPr/>
+                    <a:lstStyle/>
+                    <a:p>
+                      <a:r>
+                        <a:rPr lang="es-AR" sz="1200" dirty="0" smtClean="0"/>
+                        <a:t>38</a:t>
+                      </a:r>
+                      <a:endParaRPr lang="es-AR" sz="1200" dirty="0"/>
+                    </a:p>
+                  </a:txBody>
+                  <a:tcPr/>
+                </a:tc>
+              </a:tr>
+            </a:tbl>
+          </a:graphicData>
+        </a:graphic>
+      </p:graphicFrame>
+      <p:pic>
+        <p:nvPicPr>
+          <p:cNvPr id="14" name="Picture 3" descr="G:\reserbar-logo-sfondo.tif"/>
+          <p:cNvPicPr>
+            <a:picLocks noChangeAspect="1" noChangeArrowheads="1"/>
+          </p:cNvPicPr>
+          <p:nvPr/>
+        </p:nvPicPr>
+        <p:blipFill>
+          <a:blip r:embed="rId2" cstate="print"/>
+          <a:srcRect/>
+          <a:stretch>
+            <a:fillRect/>
+          </a:stretch>
+        </p:blipFill>
+        <p:spPr bwMode="auto">
+          <a:xfrm>
+            <a:off x="6429388" y="214290"/>
+            <a:ext cx="2714612" cy="651507"/>
+          </a:xfrm>
+          <a:prstGeom prst="rect">
+            <a:avLst/>
+          </a:prstGeom>
+          <a:noFill/>
+        </p:spPr>
+      </p:pic>
+    </p:spTree>
+  </p:cSld>
+  <p:clrMapOvr>
+    <a:masterClrMapping/>
+  </p:clrMapOvr>
+  <p:transition advTm="20000"/>
+  <p:timing>
+    <p:tnLst>
+      <p:par>
+        <p:cTn id="1" dur="indefinite" restart="never" nodeType="tmRoot">
+          <p:childTnLst>
+            <p:seq concurrent="1" nextAc="seek">
+              <p:cTn id="2" dur="indefinite" nodeType="mainSeq">
+                <p:childTnLst>
+                  <p:par>
+                    <p:cTn id="3" fill="hold">
+                      <p:stCondLst>
+                        <p:cond delay="indefinite"/>
+                      </p:stCondLst>
+                      <p:childTnLst>
+                        <p:par>
+                          <p:cTn id="4" fill="hold">
+                            <p:stCondLst>
+                              <p:cond delay="0"/>
+                            </p:stCondLst>
+                            <p:childTnLst>
+                              <p:par>
+                                <p:cTn id="5" presetID="35" presetClass="path" presetSubtype="0" accel="50000" decel="50000" fill="hold" grpId="0" nodeType="clickEffect">
+                                  <p:stCondLst>
+                                    <p:cond delay="0"/>
+                                  </p:stCondLst>
+                                  <p:childTnLst>
+                                    <p:animMotion origin="layout" path="M 5.55556E-7 2.22222E-6 L -0.92448 2.22222E-6 " pathEditMode="relative" rAng="0" ptsTypes="AA">
+                                      <p:cBhvr>
+                                        <p:cTn id="6" dur="2000" fill="hold"/>
+                                        <p:tgtEl>
+                                          <p:spTgt spid="6"/>
+                                        </p:tgtEl>
+                                        <p:attrNameLst>
+                                          <p:attrName>ppt_x</p:attrName>
+                                          <p:attrName>ppt_y</p:attrName>
+                                        </p:attrNameLst>
+                                      </p:cBhvr>
+                                      <p:rCtr x="-462" y="0"/>
+                                    </p:animMotion>
+                                  </p:childTnLst>
+                                </p:cTn>
+                              </p:par>
+                              <p:par>
+                                <p:cTn id="7" presetID="35" presetClass="path" presetSubtype="0" accel="50000" decel="50000" fill="hold" grpId="0" nodeType="withEffect">
+                                  <p:stCondLst>
+                                    <p:cond delay="0"/>
+                                  </p:stCondLst>
+                                  <p:childTnLst>
+                                    <p:animMotion origin="layout" path="M -1.11111E-6 -3.7037E-7 L -0.80104 -3.7037E-7 " pathEditMode="relative" rAng="0" ptsTypes="AA">
+                                      <p:cBhvr>
+                                        <p:cTn id="8" dur="2000" fill="hold"/>
+                                        <p:tgtEl>
+                                          <p:spTgt spid="7"/>
+                                        </p:tgtEl>
+                                        <p:attrNameLst>
+                                          <p:attrName>ppt_x</p:attrName>
+                                          <p:attrName>ppt_y</p:attrName>
+                                        </p:attrNameLst>
+                                      </p:cBhvr>
+                                      <p:rCtr x="-401" y="0"/>
+                                    </p:animMotion>
+                                  </p:childTnLst>
+                                </p:cTn>
+                              </p:par>
+                            </p:childTnLst>
+                          </p:cTn>
+                        </p:par>
+                      </p:childTnLst>
+                    </p:cTn>
+                  </p:par>
+                  <p:par>
+                    <p:cTn id="9" fill="hold">
+                      <p:stCondLst>
+                        <p:cond delay="indefinite"/>
+                      </p:stCondLst>
+                      <p:childTnLst>
+                        <p:par>
+                          <p:cTn id="10" fill="hold">
+                            <p:stCondLst>
+                              <p:cond delay="0"/>
+                            </p:stCondLst>
+                            <p:childTnLst>
+                              <p:par>
+                                <p:cTn id="11" presetID="35" presetClass="path" presetSubtype="0" accel="50000" decel="50000" fill="hold" grpId="0" nodeType="clickEffect">
+                                  <p:stCondLst>
+                                    <p:cond delay="0"/>
+                                  </p:stCondLst>
+                                  <p:childTnLst>
+                                    <p:animMotion origin="layout" path="M -3.61111E-6 -4.44444E-6 L -0.89618 -4.44444E-6 " pathEditMode="relative" rAng="0" ptsTypes="AA">
+                                      <p:cBhvr>
+                                        <p:cTn id="12" dur="2000" fill="hold"/>
+                                        <p:tgtEl>
+                                          <p:spTgt spid="8"/>
+                                        </p:tgtEl>
+                                        <p:attrNameLst>
+                                          <p:attrName>ppt_x</p:attrName>
+                                          <p:attrName>ppt_y</p:attrName>
+                                        </p:attrNameLst>
+                                      </p:cBhvr>
+                                      <p:rCtr x="-448" y="0"/>
+                                    </p:animMotion>
+                                  </p:childTnLst>
+                                </p:cTn>
+                              </p:par>
+                              <p:par>
+                                <p:cTn id="13" presetID="35" presetClass="path" presetSubtype="0" accel="50000" decel="50000" fill="hold" nodeType="withEffect">
+                                  <p:stCondLst>
+                                    <p:cond delay="0"/>
+                                  </p:stCondLst>
+                                  <p:childTnLst>
+                                    <p:animMotion origin="layout" path="M 4.72222E-6 0 L -0.92084 0 " pathEditMode="relative" rAng="0" ptsTypes="AA">
+                                      <p:cBhvr>
+                                        <p:cTn id="14" dur="2000" fill="hold"/>
+                                        <p:tgtEl>
+                                          <p:spTgt spid="16"/>
+                                        </p:tgtEl>
+                                        <p:attrNameLst>
+                                          <p:attrName>ppt_x</p:attrName>
+                                          <p:attrName>ppt_y</p:attrName>
+                                        </p:attrNameLst>
+                                      </p:cBhvr>
+                                      <p:rCtr x="-460" y="0"/>
+                                    </p:animMotion>
+                                  </p:childTnLst>
+                                </p:cTn>
+                              </p:par>
+                            </p:childTnLst>
+                          </p:cTn>
+                        </p:par>
+                      </p:childTnLst>
+                    </p:cTn>
+                  </p:par>
+                  <p:par>
+                    <p:cTn id="15" fill="hold">
+                      <p:stCondLst>
+                        <p:cond delay="indefinite"/>
+                      </p:stCondLst>
+                      <p:childTnLst>
+                        <p:par>
+                          <p:cTn id="16" fill="hold">
+                            <p:stCondLst>
+                              <p:cond delay="0"/>
+                            </p:stCondLst>
+                            <p:childTnLst>
+                              <p:par>
+                                <p:cTn id="17" presetID="35" presetClass="path" presetSubtype="0" accel="50000" decel="50000" fill="hold" grpId="0" nodeType="clickEffect">
+                                  <p:stCondLst>
+                                    <p:cond delay="0"/>
+                                  </p:stCondLst>
+                                  <p:childTnLst>
+                                    <p:animMotion origin="layout" path="M -4.16667E-6 -7.40741E-7 L -0.90954 -7.40741E-7 " pathEditMode="relative" rAng="0" ptsTypes="AA">
+                                      <p:cBhvr>
+                                        <p:cTn id="18" dur="2000" fill="hold"/>
+                                        <p:tgtEl>
+                                          <p:spTgt spid="10"/>
+                                        </p:tgtEl>
+                                        <p:attrNameLst>
+                                          <p:attrName>ppt_x</p:attrName>
+                                          <p:attrName>ppt_y</p:attrName>
+                                        </p:attrNameLst>
+                                      </p:cBhvr>
+                                      <p:rCtr x="-455" y="0"/>
+                                    </p:animMotion>
+                                  </p:childTnLst>
+                                </p:cTn>
+                              </p:par>
+                              <p:par>
+                                <p:cTn id="19" presetID="35" presetClass="path" presetSubtype="0" accel="50000" decel="50000" fill="hold" nodeType="withEffect">
+                                  <p:stCondLst>
+                                    <p:cond delay="0"/>
+                                  </p:stCondLst>
+                                  <p:childTnLst>
+                                    <p:animMotion origin="layout" path="M -2.77778E-7 -2.96296E-6 L -0.92101 -2.96296E-6 " pathEditMode="relative" rAng="0" ptsTypes="AA">
+                                      <p:cBhvr>
+                                        <p:cTn id="20" dur="2000" fill="hold"/>
+                                        <p:tgtEl>
+                                          <p:spTgt spid="17"/>
+                                        </p:tgtEl>
+                                        <p:attrNameLst>
+                                          <p:attrName>ppt_x</p:attrName>
+                                          <p:attrName>ppt_y</p:attrName>
+                                        </p:attrNameLst>
+                                      </p:cBhvr>
+                                      <p:rCtr x="-461" y="0"/>
+                                    </p:animMotion>
+                                  </p:childTnLst>
+                                </p:cTn>
+                              </p:par>
+                            </p:childTnLst>
+                          </p:cTn>
+                        </p:par>
+                      </p:childTnLst>
+                    </p:cTn>
+                  </p:par>
+                  <p:par>
+                    <p:cTn id="21" fill="hold">
+                      <p:stCondLst>
+                        <p:cond delay="indefinite"/>
+                      </p:stCondLst>
+                      <p:childTnLst>
+                        <p:par>
+                          <p:cTn id="22" fill="hold">
+                            <p:stCondLst>
+                              <p:cond delay="0"/>
+                            </p:stCondLst>
+                            <p:childTnLst>
+                              <p:par>
+                                <p:cTn id="23" presetID="35" presetClass="path" presetSubtype="0" accel="50000" decel="50000" fill="hold" grpId="0" nodeType="clickEffect">
+                                  <p:stCondLst>
+                                    <p:cond delay="0"/>
+                                  </p:stCondLst>
+                                  <p:childTnLst>
+                                    <p:animMotion origin="layout" path="M -1.94444E-6 -4.07407E-6 L -0.92014 -4.07407E-6 " pathEditMode="relative" rAng="0" ptsTypes="AA">
+                                      <p:cBhvr>
+                                        <p:cTn id="24" dur="2000" fill="hold"/>
+                                        <p:tgtEl>
+                                          <p:spTgt spid="12"/>
+                                        </p:tgtEl>
+                                        <p:attrNameLst>
+                                          <p:attrName>ppt_x</p:attrName>
+                                          <p:attrName>ppt_y</p:attrName>
+                                        </p:attrNameLst>
+                                      </p:cBhvr>
+                                      <p:rCtr x="-460" y="0"/>
+                                    </p:animMotion>
+                                  </p:childTnLst>
+                                </p:cTn>
+                              </p:par>
+                              <p:par>
+                                <p:cTn id="25" presetID="35" presetClass="path" presetSubtype="0" accel="50000" decel="50000" fill="hold" nodeType="withEffect">
+                                  <p:stCondLst>
+                                    <p:cond delay="0"/>
+                                  </p:stCondLst>
+                                  <p:childTnLst>
+                                    <p:animMotion origin="layout" path="M -2.22222E-6 -1.48148E-6 L -0.9309 -1.48148E-6 " pathEditMode="relative" rAng="0" ptsTypes="AA">
+                                      <p:cBhvr>
+                                        <p:cTn id="26" dur="2000" fill="hold"/>
+                                        <p:tgtEl>
+                                          <p:spTgt spid="13"/>
+                                        </p:tgtEl>
+                                        <p:attrNameLst>
+                                          <p:attrName>ppt_x</p:attrName>
+                                          <p:attrName>ppt_y</p:attrName>
+                                        </p:attrNameLst>
+                                      </p:cBhvr>
+                                      <p:rCtr x="-465" y="0"/>
+                                    </p:animMotion>
+                                  </p:childTnLst>
+                                </p:cTn>
+                              </p:par>
+                            </p:childTnLst>
+                          </p:cTn>
+                        </p:par>
+                      </p:childTnLst>
+                    </p:cTn>
+                  </p:par>
+                </p:childTnLst>
+              </p:cTn>
+              <p:prevCondLst>
+                <p:cond evt="onPrev" delay="0">
+                  <p:tgtEl>
+                    <p:sldTgt/>
+                  </p:tgtEl>
+                </p:cond>
+              </p:prevCondLst>
+              <p:nextCondLst>
+                <p:cond evt="onNext" delay="0">
+                  <p:tgtEl>
+                    <p:sldTgt/>
+                  </p:tgtEl>
+                </p:cond>
+              </p:nextCondLst>
+            </p:seq>
+          </p:childTnLst>
+        </p:cTn>
+      </p:par>
+    </p:tnLst>
+    <p:bldLst>
+      <p:bldP spid="6" grpId="0"/>
+      <p:bldP spid="7" grpId="0"/>
+      <p:bldP spid="8" grpId="0"/>
+      <p:bldP spid="10" grpId="0"/>
+      <p:bldP spid="12" grpId="0"/>
+    </p:bldLst>
+  </p:timing>
+</p:sld>
+</file>
+
+<file path=ppt/slides/slide11.xml><?xml version="1.0" encoding="utf-8"?>
+<p:sld xmlns:a="http://schemas.openxmlformats.org/drawingml/2006/main" xmlns:r="http://schemas.openxmlformats.org/officeDocument/2006/relationships" xmlns:p="http://schemas.openxmlformats.org/presentationml/2006/main">
+  <p:cSld>
+    <p:spTree>
+      <p:nvGrpSpPr>
+        <p:cNvPr id="1" name=""/>
+        <p:cNvGrpSpPr/>
+        <p:nvPr/>
+      </p:nvGrpSpPr>
+      <p:grpSpPr>
+        <a:xfrm>
+          <a:off x="0" y="0"/>
+          <a:ext cx="0" cy="0"/>
+          <a:chOff x="0" y="0"/>
+          <a:chExt cx="0" cy="0"/>
+        </a:xfrm>
+      </p:grpSpPr>
+      <p:sp>
+        <p:nvSpPr>
+          <p:cNvPr id="5" name="4 CuadroTexto"/>
+          <p:cNvSpPr txBox="1"/>
+          <p:nvPr/>
+        </p:nvSpPr>
+        <p:spPr>
+          <a:xfrm>
+            <a:off x="928662" y="1071546"/>
+            <a:ext cx="3230372" cy="523220"/>
+          </a:xfrm>
+          <a:prstGeom prst="rect">
+            <a:avLst/>
+          </a:prstGeom>
+          <a:noFill/>
+        </p:spPr>
+        <p:txBody>
+          <a:bodyPr wrap="none" rtlCol="0">
+            <a:spAutoFit/>
+          </a:bodyPr>
+          <a:lstStyle/>
+          <a:p>
+            <a:r>
+              <a:rPr lang="es-ES_tradnl" sz="2800" b="1" dirty="0" smtClean="0">
+                <a:latin typeface="Corbel" pitchFamily="34" charset="0"/>
+              </a:rPr>
+              <a:t>Métricas del </a:t>
+            </a:r>
+            <a:r>
+              <a:rPr lang="es-ES_tradnl" sz="2800" b="1" dirty="0" err="1" smtClean="0">
+                <a:latin typeface="Corbel" pitchFamily="34" charset="0"/>
+              </a:rPr>
+              <a:t>Testing</a:t>
+            </a:r>
+            <a:endParaRPr lang="es-ES" sz="2800" b="1" dirty="0">
+              <a:latin typeface="Corbel" pitchFamily="34" charset="0"/>
+            </a:endParaRPr>
+          </a:p>
+        </p:txBody>
+      </p:sp>
       <p:pic>
         <p:nvPicPr>
           <p:cNvPr id="2050" name="Picture 2"/>
@@ -6465,7 +8226,7 @@
 </p:sld>
 </file>
 
-<file path=ppt/slides/slide11.xml><?xml version="1.0" encoding="utf-8"?>
+<file path=ppt/slides/slide12.xml><?xml version="1.0" encoding="utf-8"?>
 <p:sld xmlns:a="http://schemas.openxmlformats.org/drawingml/2006/main" xmlns:r="http://schemas.openxmlformats.org/officeDocument/2006/relationships" xmlns:p="http://schemas.openxmlformats.org/presentationml/2006/main">
   <p:cSld>
     <p:spTree>
@@ -6793,7 +8554,7 @@
 </p:sld>
 </file>
 
-<file path=ppt/slides/slide12.xml><?xml version="1.0" encoding="utf-8"?>
+<file path=ppt/slides/slide13.xml><?xml version="1.0" encoding="utf-8"?>
 <p:sld xmlns:a="http://schemas.openxmlformats.org/drawingml/2006/main" xmlns:r="http://schemas.openxmlformats.org/officeDocument/2006/relationships" xmlns:p="http://schemas.openxmlformats.org/presentationml/2006/main">
   <p:cSld>
     <p:spTree>
@@ -7121,7 +8882,7 @@
 </p:sld>
 </file>
 
-<file path=ppt/slides/slide13.xml><?xml version="1.0" encoding="utf-8"?>
+<file path=ppt/slides/slide14.xml><?xml version="1.0" encoding="utf-8"?>
 <p:sld xmlns:a="http://schemas.openxmlformats.org/drawingml/2006/main" xmlns:r="http://schemas.openxmlformats.org/officeDocument/2006/relationships" xmlns:p="http://schemas.openxmlformats.org/presentationml/2006/main">
   <p:cSld>
     <p:spTree>
@@ -7608,7 +9369,7 @@
 </p:sld>
 </file>
 
-<file path=ppt/slides/slide14.xml><?xml version="1.0" encoding="utf-8"?>
+<file path=ppt/slides/slide15.xml><?xml version="1.0" encoding="utf-8"?>
 <p:sld xmlns:a="http://schemas.openxmlformats.org/drawingml/2006/main" xmlns:r="http://schemas.openxmlformats.org/officeDocument/2006/relationships" xmlns:p="http://schemas.openxmlformats.org/presentationml/2006/main">
   <p:cSld>
     <p:spTree>
@@ -14383,7 +16144,7 @@
 </p:sld>
 </file>
 
-<file path=ppt/slides/slide15.xml><?xml version="1.0" encoding="utf-8"?>
+<file path=ppt/slides/slide16.xml><?xml version="1.0" encoding="utf-8"?>
 <p:sld xmlns:a="http://schemas.openxmlformats.org/drawingml/2006/main" xmlns:r="http://schemas.openxmlformats.org/officeDocument/2006/relationships" xmlns:p="http://schemas.openxmlformats.org/presentationml/2006/main">
   <p:cSld>
     <p:spTree>
@@ -14628,7 +16389,7 @@
 </p:sld>
 </file>
 
-<file path=ppt/slides/slide16.xml><?xml version="1.0" encoding="utf-8"?>
+<file path=ppt/slides/slide17.xml><?xml version="1.0" encoding="utf-8"?>
 <p:sld xmlns:a="http://schemas.openxmlformats.org/drawingml/2006/main" xmlns:r="http://schemas.openxmlformats.org/officeDocument/2006/relationships" xmlns:p="http://schemas.openxmlformats.org/presentationml/2006/main">
   <p:cSld>
     <p:spTree>
@@ -19752,7 +21513,7 @@
 </p:sld>
 </file>
 
-<file path=ppt/slides/slide17.xml><?xml version="1.0" encoding="utf-8"?>
+<file path=ppt/slides/slide18.xml><?xml version="1.0" encoding="utf-8"?>
 <p:sld xmlns:a="http://schemas.openxmlformats.org/drawingml/2006/main" xmlns:r="http://schemas.openxmlformats.org/officeDocument/2006/relationships" xmlns:p="http://schemas.openxmlformats.org/presentationml/2006/main">
   <p:cSld>
     <p:spTree>
@@ -20131,7 +21892,7 @@
 </p:sld>
 </file>
 
-<file path=ppt/slides/slide18.xml><?xml version="1.0" encoding="utf-8"?>
+<file path=ppt/slides/slide19.xml><?xml version="1.0" encoding="utf-8"?>
 <p:sld xmlns:a="http://schemas.openxmlformats.org/drawingml/2006/main" xmlns:r="http://schemas.openxmlformats.org/officeDocument/2006/relationships" xmlns:p="http://schemas.openxmlformats.org/presentationml/2006/main">
   <p:cSld>
     <p:spTree>
@@ -25255,7 +27016,277 @@
 </p:sld>
 </file>
 
-<file path=ppt/slides/slide19.xml><?xml version="1.0" encoding="utf-8"?>
+<file path=ppt/slides/slide2.xml><?xml version="1.0" encoding="utf-8"?>
+<p:sld xmlns:a="http://schemas.openxmlformats.org/drawingml/2006/main" xmlns:r="http://schemas.openxmlformats.org/officeDocument/2006/relationships" xmlns:p="http://schemas.openxmlformats.org/presentationml/2006/main">
+  <p:cSld>
+    <p:spTree>
+      <p:nvGrpSpPr>
+        <p:cNvPr id="1" name=""/>
+        <p:cNvGrpSpPr/>
+        <p:nvPr/>
+      </p:nvGrpSpPr>
+      <p:grpSpPr>
+        <a:xfrm>
+          <a:off x="0" y="0"/>
+          <a:ext cx="0" cy="0"/>
+          <a:chOff x="0" y="0"/>
+          <a:chExt cx="0" cy="0"/>
+        </a:xfrm>
+      </p:grpSpPr>
+      <p:sp>
+        <p:nvSpPr>
+          <p:cNvPr id="4" name="3 CuadroTexto"/>
+          <p:cNvSpPr txBox="1"/>
+          <p:nvPr/>
+        </p:nvSpPr>
+        <p:spPr>
+          <a:xfrm>
+            <a:off x="928662" y="1071546"/>
+            <a:ext cx="4084451" cy="523220"/>
+          </a:xfrm>
+          <a:prstGeom prst="rect">
+            <a:avLst/>
+          </a:prstGeom>
+          <a:noFill/>
+        </p:spPr>
+        <p:txBody>
+          <a:bodyPr wrap="none" rtlCol="0">
+            <a:spAutoFit/>
+          </a:bodyPr>
+          <a:lstStyle/>
+          <a:p>
+            <a:r>
+              <a:rPr lang="es-ES_tradnl" sz="2800" b="1" dirty="0" smtClean="0">
+                <a:latin typeface="Corbel" pitchFamily="34" charset="0"/>
+              </a:rPr>
+              <a:t>Temas de la presentación</a:t>
+            </a:r>
+            <a:endParaRPr lang="es-ES" sz="2800" b="1" dirty="0">
+              <a:latin typeface="Corbel" pitchFamily="34" charset="0"/>
+            </a:endParaRPr>
+          </a:p>
+        </p:txBody>
+      </p:sp>
+      <p:sp>
+        <p:nvSpPr>
+          <p:cNvPr id="5" name="4 CuadroTexto"/>
+          <p:cNvSpPr txBox="1"/>
+          <p:nvPr/>
+        </p:nvSpPr>
+        <p:spPr>
+          <a:xfrm>
+            <a:off x="1428728" y="1714488"/>
+            <a:ext cx="3228769" cy="4278094"/>
+          </a:xfrm>
+          <a:prstGeom prst="rect">
+            <a:avLst/>
+          </a:prstGeom>
+          <a:noFill/>
+        </p:spPr>
+        <p:txBody>
+          <a:bodyPr wrap="none" rtlCol="0">
+            <a:spAutoFit/>
+          </a:bodyPr>
+          <a:lstStyle/>
+          <a:p>
+            <a:pPr>
+              <a:buFont typeface="Arial" pitchFamily="34" charset="0"/>
+              <a:buChar char="•"/>
+            </a:pPr>
+            <a:r>
+              <a:rPr lang="es-ES_tradnl" sz="1600" dirty="0" smtClean="0"/>
+              <a:t> Asignación de Roles</a:t>
+            </a:r>
+          </a:p>
+          <a:p>
+            <a:pPr>
+              <a:buFont typeface="Arial" pitchFamily="34" charset="0"/>
+              <a:buChar char="•"/>
+            </a:pPr>
+            <a:endParaRPr lang="es-ES_tradnl" sz="1600" dirty="0" smtClean="0"/>
+          </a:p>
+          <a:p>
+            <a:pPr>
+              <a:buFont typeface="Arial" pitchFamily="34" charset="0"/>
+              <a:buChar char="•"/>
+            </a:pPr>
+            <a:r>
+              <a:rPr lang="es-ES_tradnl" sz="1600" dirty="0" smtClean="0"/>
+              <a:t> Mercado</a:t>
+            </a:r>
+          </a:p>
+          <a:p>
+            <a:pPr>
+              <a:buFont typeface="Arial" pitchFamily="34" charset="0"/>
+              <a:buChar char="•"/>
+            </a:pPr>
+            <a:endParaRPr lang="es-ES_tradnl" sz="1600" dirty="0" smtClean="0"/>
+          </a:p>
+          <a:p>
+            <a:pPr>
+              <a:buFont typeface="Arial" pitchFamily="34" charset="0"/>
+              <a:buChar char="•"/>
+            </a:pPr>
+            <a:r>
+              <a:rPr lang="es-ES_tradnl" sz="1600" dirty="0" smtClean="0"/>
+              <a:t> Herramientas</a:t>
+            </a:r>
+          </a:p>
+          <a:p>
+            <a:pPr>
+              <a:buFont typeface="Arial" pitchFamily="34" charset="0"/>
+              <a:buChar char="•"/>
+            </a:pPr>
+            <a:endParaRPr lang="es-ES_tradnl" sz="1600" dirty="0" smtClean="0"/>
+          </a:p>
+          <a:p>
+            <a:pPr>
+              <a:buFont typeface="Arial" pitchFamily="34" charset="0"/>
+              <a:buChar char="•"/>
+            </a:pPr>
+            <a:r>
+              <a:rPr lang="es-ES_tradnl" sz="1600" dirty="0" smtClean="0"/>
+              <a:t> Métricas x Etapa</a:t>
+            </a:r>
+          </a:p>
+          <a:p>
+            <a:pPr>
+              <a:buFont typeface="Arial" pitchFamily="34" charset="0"/>
+              <a:buChar char="•"/>
+            </a:pPr>
+            <a:endParaRPr lang="es-ES_tradnl" sz="1600" dirty="0" smtClean="0"/>
+          </a:p>
+          <a:p>
+            <a:pPr>
+              <a:buFont typeface="Arial" pitchFamily="34" charset="0"/>
+              <a:buChar char="•"/>
+            </a:pPr>
+            <a:r>
+              <a:rPr lang="es-ES_tradnl" sz="1600" dirty="0" smtClean="0"/>
+              <a:t> Métricas del </a:t>
+            </a:r>
+            <a:r>
+              <a:rPr lang="es-ES_tradnl" sz="1600" dirty="0" err="1" smtClean="0"/>
+              <a:t>Testing</a:t>
+            </a:r>
+            <a:endParaRPr lang="es-ES_tradnl" sz="1600" dirty="0" smtClean="0"/>
+          </a:p>
+          <a:p>
+            <a:pPr>
+              <a:buFont typeface="Arial" pitchFamily="34" charset="0"/>
+              <a:buChar char="•"/>
+            </a:pPr>
+            <a:endParaRPr lang="es-ES_tradnl" sz="1600" dirty="0" smtClean="0"/>
+          </a:p>
+          <a:p>
+            <a:pPr>
+              <a:buFont typeface="Arial" pitchFamily="34" charset="0"/>
+              <a:buChar char="•"/>
+            </a:pPr>
+            <a:r>
+              <a:rPr lang="es-ES_tradnl" sz="1600" dirty="0" smtClean="0"/>
+              <a:t> Flujo de una reserva</a:t>
+            </a:r>
+          </a:p>
+          <a:p>
+            <a:pPr>
+              <a:buFont typeface="Arial" pitchFamily="34" charset="0"/>
+              <a:buChar char="•"/>
+            </a:pPr>
+            <a:endParaRPr lang="es-ES_tradnl" sz="1600" dirty="0" smtClean="0"/>
+          </a:p>
+          <a:p>
+            <a:pPr>
+              <a:buFont typeface="Arial" pitchFamily="34" charset="0"/>
+              <a:buChar char="•"/>
+            </a:pPr>
+            <a:r>
+              <a:rPr lang="es-ES_tradnl" sz="1600" dirty="0" smtClean="0"/>
+              <a:t> Cambios solicitados</a:t>
+            </a:r>
+          </a:p>
+          <a:p>
+            <a:pPr>
+              <a:buFont typeface="Arial" pitchFamily="34" charset="0"/>
+              <a:buChar char="•"/>
+            </a:pPr>
+            <a:endParaRPr lang="es-ES_tradnl" sz="1600" dirty="0" smtClean="0"/>
+          </a:p>
+          <a:p>
+            <a:pPr>
+              <a:buFont typeface="Arial" pitchFamily="34" charset="0"/>
+              <a:buChar char="•"/>
+            </a:pPr>
+            <a:r>
+              <a:rPr lang="es-ES_tradnl" sz="1600" dirty="0" smtClean="0"/>
+              <a:t> Presentación de la Aplicación</a:t>
+            </a:r>
+          </a:p>
+          <a:p>
+            <a:pPr>
+              <a:buFont typeface="Arial" pitchFamily="34" charset="0"/>
+              <a:buChar char="•"/>
+            </a:pPr>
+            <a:endParaRPr lang="es-ES_tradnl" sz="1600" dirty="0" smtClean="0"/>
+          </a:p>
+          <a:p>
+            <a:pPr>
+              <a:buFont typeface="Arial" pitchFamily="34" charset="0"/>
+              <a:buChar char="•"/>
+            </a:pPr>
+            <a:r>
+              <a:rPr lang="es-ES_tradnl" sz="1600" dirty="0" smtClean="0"/>
+              <a:t> Conclusiones</a:t>
+            </a:r>
+            <a:endParaRPr lang="es-ES" sz="1600" dirty="0"/>
+          </a:p>
+        </p:txBody>
+      </p:sp>
+      <p:pic>
+        <p:nvPicPr>
+          <p:cNvPr id="6" name="Picture 3" descr="G:\reserbar-logo-sfondo.tif"/>
+          <p:cNvPicPr>
+            <a:picLocks noChangeAspect="1" noChangeArrowheads="1"/>
+          </p:cNvPicPr>
+          <p:nvPr/>
+        </p:nvPicPr>
+        <p:blipFill>
+          <a:blip r:embed="rId2" cstate="print"/>
+          <a:srcRect/>
+          <a:stretch>
+            <a:fillRect/>
+          </a:stretch>
+        </p:blipFill>
+        <p:spPr bwMode="auto">
+          <a:xfrm>
+            <a:off x="6429388" y="214290"/>
+            <a:ext cx="2714612" cy="651507"/>
+          </a:xfrm>
+          <a:prstGeom prst="rect">
+            <a:avLst/>
+          </a:prstGeom>
+          <a:noFill/>
+        </p:spPr>
+      </p:pic>
+    </p:spTree>
+  </p:cSld>
+  <p:clrMapOvr>
+    <a:masterClrMapping/>
+  </p:clrMapOvr>
+  <p:transition advTm="20000">
+    <p:fade thruBlk="1"/>
+  </p:transition>
+  <p:timing>
+    <p:tnLst>
+      <p:par>
+        <p:cTn id="1" dur="indefinite" restart="never" nodeType="tmRoot"/>
+      </p:par>
+    </p:tnLst>
+  </p:timing>
+</p:sld>
+</file>
+
+<file path=ppt/slides/slide20.xml><?xml version="1.0" encoding="utf-8"?>
 <p:sld xmlns:a="http://schemas.openxmlformats.org/drawingml/2006/main" xmlns:r="http://schemas.openxmlformats.org/officeDocument/2006/relationships" xmlns:p="http://schemas.openxmlformats.org/presentationml/2006/main">
   <p:cSld>
     <p:spTree>
@@ -25589,277 +27620,7 @@
 </p:sld>
 </file>
 
-<file path=ppt/slides/slide2.xml><?xml version="1.0" encoding="utf-8"?>
-<p:sld xmlns:a="http://schemas.openxmlformats.org/drawingml/2006/main" xmlns:r="http://schemas.openxmlformats.org/officeDocument/2006/relationships" xmlns:p="http://schemas.openxmlformats.org/presentationml/2006/main">
-  <p:cSld>
-    <p:spTree>
-      <p:nvGrpSpPr>
-        <p:cNvPr id="1" name=""/>
-        <p:cNvGrpSpPr/>
-        <p:nvPr/>
-      </p:nvGrpSpPr>
-      <p:grpSpPr>
-        <a:xfrm>
-          <a:off x="0" y="0"/>
-          <a:ext cx="0" cy="0"/>
-          <a:chOff x="0" y="0"/>
-          <a:chExt cx="0" cy="0"/>
-        </a:xfrm>
-      </p:grpSpPr>
-      <p:sp>
-        <p:nvSpPr>
-          <p:cNvPr id="4" name="3 CuadroTexto"/>
-          <p:cNvSpPr txBox="1"/>
-          <p:nvPr/>
-        </p:nvSpPr>
-        <p:spPr>
-          <a:xfrm>
-            <a:off x="928662" y="1071546"/>
-            <a:ext cx="4084451" cy="523220"/>
-          </a:xfrm>
-          <a:prstGeom prst="rect">
-            <a:avLst/>
-          </a:prstGeom>
-          <a:noFill/>
-        </p:spPr>
-        <p:txBody>
-          <a:bodyPr wrap="none" rtlCol="0">
-            <a:spAutoFit/>
-          </a:bodyPr>
-          <a:lstStyle/>
-          <a:p>
-            <a:r>
-              <a:rPr lang="es-ES_tradnl" sz="2800" b="1" dirty="0" smtClean="0">
-                <a:latin typeface="Corbel" pitchFamily="34" charset="0"/>
-              </a:rPr>
-              <a:t>Temas de la presentación</a:t>
-            </a:r>
-            <a:endParaRPr lang="es-ES" sz="2800" b="1" dirty="0">
-              <a:latin typeface="Corbel" pitchFamily="34" charset="0"/>
-            </a:endParaRPr>
-          </a:p>
-        </p:txBody>
-      </p:sp>
-      <p:sp>
-        <p:nvSpPr>
-          <p:cNvPr id="5" name="4 CuadroTexto"/>
-          <p:cNvSpPr txBox="1"/>
-          <p:nvPr/>
-        </p:nvSpPr>
-        <p:spPr>
-          <a:xfrm>
-            <a:off x="1428728" y="1714488"/>
-            <a:ext cx="3228769" cy="4278094"/>
-          </a:xfrm>
-          <a:prstGeom prst="rect">
-            <a:avLst/>
-          </a:prstGeom>
-          <a:noFill/>
-        </p:spPr>
-        <p:txBody>
-          <a:bodyPr wrap="none" rtlCol="0">
-            <a:spAutoFit/>
-          </a:bodyPr>
-          <a:lstStyle/>
-          <a:p>
-            <a:pPr>
-              <a:buFont typeface="Arial" pitchFamily="34" charset="0"/>
-              <a:buChar char="•"/>
-            </a:pPr>
-            <a:r>
-              <a:rPr lang="es-ES_tradnl" sz="1600" dirty="0" smtClean="0"/>
-              <a:t> Asignación de Roles</a:t>
-            </a:r>
-          </a:p>
-          <a:p>
-            <a:pPr>
-              <a:buFont typeface="Arial" pitchFamily="34" charset="0"/>
-              <a:buChar char="•"/>
-            </a:pPr>
-            <a:endParaRPr lang="es-ES_tradnl" sz="1600" dirty="0" smtClean="0"/>
-          </a:p>
-          <a:p>
-            <a:pPr>
-              <a:buFont typeface="Arial" pitchFamily="34" charset="0"/>
-              <a:buChar char="•"/>
-            </a:pPr>
-            <a:r>
-              <a:rPr lang="es-ES_tradnl" sz="1600" dirty="0" smtClean="0"/>
-              <a:t> Mercado</a:t>
-            </a:r>
-          </a:p>
-          <a:p>
-            <a:pPr>
-              <a:buFont typeface="Arial" pitchFamily="34" charset="0"/>
-              <a:buChar char="•"/>
-            </a:pPr>
-            <a:endParaRPr lang="es-ES_tradnl" sz="1600" dirty="0" smtClean="0"/>
-          </a:p>
-          <a:p>
-            <a:pPr>
-              <a:buFont typeface="Arial" pitchFamily="34" charset="0"/>
-              <a:buChar char="•"/>
-            </a:pPr>
-            <a:r>
-              <a:rPr lang="es-ES_tradnl" sz="1600" dirty="0" smtClean="0"/>
-              <a:t> Herramientas</a:t>
-            </a:r>
-          </a:p>
-          <a:p>
-            <a:pPr>
-              <a:buFont typeface="Arial" pitchFamily="34" charset="0"/>
-              <a:buChar char="•"/>
-            </a:pPr>
-            <a:endParaRPr lang="es-ES_tradnl" sz="1600" dirty="0" smtClean="0"/>
-          </a:p>
-          <a:p>
-            <a:pPr>
-              <a:buFont typeface="Arial" pitchFamily="34" charset="0"/>
-              <a:buChar char="•"/>
-            </a:pPr>
-            <a:r>
-              <a:rPr lang="es-ES_tradnl" sz="1600" dirty="0" smtClean="0"/>
-              <a:t> Métricas x Etapa</a:t>
-            </a:r>
-          </a:p>
-          <a:p>
-            <a:pPr>
-              <a:buFont typeface="Arial" pitchFamily="34" charset="0"/>
-              <a:buChar char="•"/>
-            </a:pPr>
-            <a:endParaRPr lang="es-ES_tradnl" sz="1600" dirty="0" smtClean="0"/>
-          </a:p>
-          <a:p>
-            <a:pPr>
-              <a:buFont typeface="Arial" pitchFamily="34" charset="0"/>
-              <a:buChar char="•"/>
-            </a:pPr>
-            <a:r>
-              <a:rPr lang="es-ES_tradnl" sz="1600" dirty="0" smtClean="0"/>
-              <a:t> Métricas del </a:t>
-            </a:r>
-            <a:r>
-              <a:rPr lang="es-ES_tradnl" sz="1600" dirty="0" err="1" smtClean="0"/>
-              <a:t>Testing</a:t>
-            </a:r>
-            <a:endParaRPr lang="es-ES_tradnl" sz="1600" dirty="0" smtClean="0"/>
-          </a:p>
-          <a:p>
-            <a:pPr>
-              <a:buFont typeface="Arial" pitchFamily="34" charset="0"/>
-              <a:buChar char="•"/>
-            </a:pPr>
-            <a:endParaRPr lang="es-ES_tradnl" sz="1600" dirty="0" smtClean="0"/>
-          </a:p>
-          <a:p>
-            <a:pPr>
-              <a:buFont typeface="Arial" pitchFamily="34" charset="0"/>
-              <a:buChar char="•"/>
-            </a:pPr>
-            <a:r>
-              <a:rPr lang="es-ES_tradnl" sz="1600" dirty="0" smtClean="0"/>
-              <a:t> Flujo de una reserva</a:t>
-            </a:r>
-          </a:p>
-          <a:p>
-            <a:pPr>
-              <a:buFont typeface="Arial" pitchFamily="34" charset="0"/>
-              <a:buChar char="•"/>
-            </a:pPr>
-            <a:endParaRPr lang="es-ES_tradnl" sz="1600" dirty="0" smtClean="0"/>
-          </a:p>
-          <a:p>
-            <a:pPr>
-              <a:buFont typeface="Arial" pitchFamily="34" charset="0"/>
-              <a:buChar char="•"/>
-            </a:pPr>
-            <a:r>
-              <a:rPr lang="es-ES_tradnl" sz="1600" dirty="0" smtClean="0"/>
-              <a:t> Cambios solicitados</a:t>
-            </a:r>
-          </a:p>
-          <a:p>
-            <a:pPr>
-              <a:buFont typeface="Arial" pitchFamily="34" charset="0"/>
-              <a:buChar char="•"/>
-            </a:pPr>
-            <a:endParaRPr lang="es-ES_tradnl" sz="1600" dirty="0" smtClean="0"/>
-          </a:p>
-          <a:p>
-            <a:pPr>
-              <a:buFont typeface="Arial" pitchFamily="34" charset="0"/>
-              <a:buChar char="•"/>
-            </a:pPr>
-            <a:r>
-              <a:rPr lang="es-ES_tradnl" sz="1600" dirty="0" smtClean="0"/>
-              <a:t> Presentación de la Aplicación</a:t>
-            </a:r>
-          </a:p>
-          <a:p>
-            <a:pPr>
-              <a:buFont typeface="Arial" pitchFamily="34" charset="0"/>
-              <a:buChar char="•"/>
-            </a:pPr>
-            <a:endParaRPr lang="es-ES_tradnl" sz="1600" dirty="0" smtClean="0"/>
-          </a:p>
-          <a:p>
-            <a:pPr>
-              <a:buFont typeface="Arial" pitchFamily="34" charset="0"/>
-              <a:buChar char="•"/>
-            </a:pPr>
-            <a:r>
-              <a:rPr lang="es-ES_tradnl" sz="1600" dirty="0" smtClean="0"/>
-              <a:t> Conclusiones</a:t>
-            </a:r>
-            <a:endParaRPr lang="es-ES" sz="1600" dirty="0"/>
-          </a:p>
-        </p:txBody>
-      </p:sp>
-      <p:pic>
-        <p:nvPicPr>
-          <p:cNvPr id="6" name="Picture 3" descr="G:\reserbar-logo-sfondo.tif"/>
-          <p:cNvPicPr>
-            <a:picLocks noChangeAspect="1" noChangeArrowheads="1"/>
-          </p:cNvPicPr>
-          <p:nvPr/>
-        </p:nvPicPr>
-        <p:blipFill>
-          <a:blip r:embed="rId2" cstate="print"/>
-          <a:srcRect/>
-          <a:stretch>
-            <a:fillRect/>
-          </a:stretch>
-        </p:blipFill>
-        <p:spPr bwMode="auto">
-          <a:xfrm>
-            <a:off x="6429388" y="214290"/>
-            <a:ext cx="2714612" cy="651507"/>
-          </a:xfrm>
-          <a:prstGeom prst="rect">
-            <a:avLst/>
-          </a:prstGeom>
-          <a:noFill/>
-        </p:spPr>
-      </p:pic>
-    </p:spTree>
-  </p:cSld>
-  <p:clrMapOvr>
-    <a:masterClrMapping/>
-  </p:clrMapOvr>
-  <p:transition advTm="20000">
-    <p:fade thruBlk="1"/>
-  </p:transition>
-  <p:timing>
-    <p:tnLst>
-      <p:par>
-        <p:cTn id="1" dur="indefinite" restart="never" nodeType="tmRoot"/>
-      </p:par>
-    </p:tnLst>
-  </p:timing>
-</p:sld>
-</file>
-
-<file path=ppt/slides/slide20.xml><?xml version="1.0" encoding="utf-8"?>
+<file path=ppt/slides/slide21.xml><?xml version="1.0" encoding="utf-8"?>
 <p:sld xmlns:a="http://schemas.openxmlformats.org/drawingml/2006/main" xmlns:r="http://schemas.openxmlformats.org/officeDocument/2006/relationships" xmlns:p="http://schemas.openxmlformats.org/presentationml/2006/main">
   <p:cSld>
     <p:spTree>
@@ -28064,14 +29825,14 @@
       </p:grpSpPr>
       <p:sp>
         <p:nvSpPr>
-          <p:cNvPr id="5" name="4 CuadroTexto"/>
+          <p:cNvPr id="3" name="2 CuadroTexto"/>
           <p:cNvSpPr txBox="1"/>
           <p:nvPr/>
         </p:nvSpPr>
         <p:spPr>
           <a:xfrm>
             <a:off x="928662" y="1071546"/>
-            <a:ext cx="3230372" cy="523220"/>
+            <a:ext cx="3219151" cy="523220"/>
           </a:xfrm>
           <a:prstGeom prst="rect">
             <a:avLst/>
@@ -28088,13 +29849,7 @@
               <a:rPr lang="es-ES_tradnl" sz="2800" b="1" dirty="0" smtClean="0">
                 <a:latin typeface="Corbel" pitchFamily="34" charset="0"/>
               </a:rPr>
-              <a:t>Métricas del </a:t>
-            </a:r>
-            <a:r>
-              <a:rPr lang="es-ES_tradnl" sz="2800" b="1" dirty="0" err="1" smtClean="0">
-                <a:latin typeface="Corbel" pitchFamily="34" charset="0"/>
-              </a:rPr>
-              <a:t>Testing</a:t>
+              <a:t>Métricas por Etapas</a:t>
             </a:r>
             <a:endParaRPr lang="es-ES" sz="2800" b="1" dirty="0">
               <a:latin typeface="Corbel" pitchFamily="34" charset="0"/>
@@ -28102,1392 +29857,9 @@
           </a:p>
         </p:txBody>
       </p:sp>
-      <p:sp>
-        <p:nvSpPr>
-          <p:cNvPr id="6" name="5 CuadroTexto"/>
-          <p:cNvSpPr txBox="1"/>
-          <p:nvPr/>
-        </p:nvSpPr>
-        <p:spPr>
-          <a:xfrm>
-            <a:off x="9324528" y="1857364"/>
-            <a:ext cx="2793842" cy="353943"/>
-          </a:xfrm>
-          <a:prstGeom prst="rect">
-            <a:avLst/>
-          </a:prstGeom>
-          <a:noFill/>
-        </p:spPr>
-        <p:txBody>
-          <a:bodyPr wrap="none" rtlCol="0">
-            <a:spAutoFit/>
-          </a:bodyPr>
-          <a:lstStyle/>
-          <a:p>
-            <a:r>
-              <a:rPr lang="es-AR" sz="1700" dirty="0" smtClean="0">
-                <a:latin typeface="Corbel" pitchFamily="34" charset="0"/>
-              </a:rPr>
-              <a:t>Cantidad de Casos de Prueba</a:t>
-            </a:r>
-            <a:endParaRPr lang="es-AR" sz="1700" dirty="0">
-              <a:latin typeface="Corbel" pitchFamily="34" charset="0"/>
-            </a:endParaRPr>
-          </a:p>
-        </p:txBody>
-      </p:sp>
-      <p:sp>
-        <p:nvSpPr>
-          <p:cNvPr id="7" name="6 CuadroTexto"/>
-          <p:cNvSpPr txBox="1"/>
-          <p:nvPr/>
-        </p:nvSpPr>
-        <p:spPr>
-          <a:xfrm>
-            <a:off x="12329992" y="1857364"/>
-            <a:ext cx="574196" cy="338554"/>
-          </a:xfrm>
-          <a:prstGeom prst="rect">
-            <a:avLst/>
-          </a:prstGeom>
-          <a:noFill/>
-        </p:spPr>
-        <p:txBody>
-          <a:bodyPr wrap="none" rtlCol="0">
-            <a:spAutoFit/>
-          </a:bodyPr>
-          <a:lstStyle/>
-          <a:p>
-            <a:r>
-              <a:rPr lang="es-AR" sz="1600" dirty="0" smtClean="0"/>
-              <a:t>383</a:t>
-            </a:r>
-            <a:endParaRPr lang="es-AR" sz="1600" dirty="0"/>
-          </a:p>
-        </p:txBody>
-      </p:sp>
-      <p:sp>
-        <p:nvSpPr>
-          <p:cNvPr id="8" name="7 CuadroTexto"/>
-          <p:cNvSpPr txBox="1"/>
-          <p:nvPr/>
-        </p:nvSpPr>
-        <p:spPr>
-          <a:xfrm>
-            <a:off x="9267362" y="2571744"/>
-            <a:ext cx="1814920" cy="353943"/>
-          </a:xfrm>
-          <a:prstGeom prst="rect">
-            <a:avLst/>
-          </a:prstGeom>
-          <a:noFill/>
-        </p:spPr>
-        <p:txBody>
-          <a:bodyPr wrap="none" rtlCol="0">
-            <a:spAutoFit/>
-          </a:bodyPr>
-          <a:lstStyle/>
-          <a:p>
-            <a:r>
-              <a:rPr lang="es-AR" sz="1700" dirty="0" smtClean="0">
-                <a:latin typeface="Corbel" pitchFamily="34" charset="0"/>
-              </a:rPr>
-              <a:t>Criterio de Parada</a:t>
-            </a:r>
-            <a:endParaRPr lang="es-AR" sz="1700" dirty="0">
-              <a:latin typeface="Corbel" pitchFamily="34" charset="0"/>
-            </a:endParaRPr>
-          </a:p>
-        </p:txBody>
-      </p:sp>
-      <p:sp>
-        <p:nvSpPr>
-          <p:cNvPr id="10" name="9 CuadroTexto"/>
-          <p:cNvSpPr txBox="1"/>
-          <p:nvPr/>
-        </p:nvSpPr>
-        <p:spPr>
-          <a:xfrm>
-            <a:off x="9274569" y="3789437"/>
-            <a:ext cx="2188484" cy="353943"/>
-          </a:xfrm>
-          <a:prstGeom prst="rect">
-            <a:avLst/>
-          </a:prstGeom>
-          <a:noFill/>
-        </p:spPr>
-        <p:txBody>
-          <a:bodyPr wrap="none" rtlCol="0">
-            <a:spAutoFit/>
-          </a:bodyPr>
-          <a:lstStyle/>
-          <a:p>
-            <a:r>
-              <a:rPr lang="es-AR" sz="1700" dirty="0" smtClean="0">
-                <a:latin typeface="Corbel" pitchFamily="34" charset="0"/>
-              </a:rPr>
-              <a:t>Criterio de Aceptación</a:t>
-            </a:r>
-            <a:endParaRPr lang="es-AR" sz="1700" dirty="0">
-              <a:latin typeface="Corbel" pitchFamily="34" charset="0"/>
-            </a:endParaRPr>
-          </a:p>
-        </p:txBody>
-      </p:sp>
-      <p:sp>
-        <p:nvSpPr>
-          <p:cNvPr id="12" name="11 CuadroTexto"/>
-          <p:cNvSpPr txBox="1"/>
-          <p:nvPr/>
-        </p:nvSpPr>
-        <p:spPr>
-          <a:xfrm>
-            <a:off x="9252520" y="5218197"/>
-            <a:ext cx="2281971" cy="353943"/>
-          </a:xfrm>
-          <a:prstGeom prst="rect">
-            <a:avLst/>
-          </a:prstGeom>
-          <a:noFill/>
-        </p:spPr>
-        <p:txBody>
-          <a:bodyPr wrap="none" rtlCol="0">
-            <a:spAutoFit/>
-          </a:bodyPr>
-          <a:lstStyle/>
-          <a:p>
-            <a:r>
-              <a:rPr lang="es-AR" sz="1700" dirty="0" smtClean="0">
-                <a:latin typeface="Corbel" pitchFamily="34" charset="0"/>
-              </a:rPr>
-              <a:t>Resultado de cada ciclo</a:t>
-            </a:r>
-            <a:endParaRPr lang="es-AR" sz="1700" dirty="0">
-              <a:latin typeface="Corbel" pitchFamily="34" charset="0"/>
-            </a:endParaRPr>
-          </a:p>
-        </p:txBody>
-      </p:sp>
-      <p:graphicFrame>
-        <p:nvGraphicFramePr>
-          <p:cNvPr id="13" name="12 Tabla"/>
-          <p:cNvGraphicFramePr>
-            <a:graphicFrameLocks noGrp="1"/>
-          </p:cNvGraphicFramePr>
-          <p:nvPr/>
-        </p:nvGraphicFramePr>
-        <p:xfrm>
-          <a:off x="12219729" y="4714884"/>
-          <a:ext cx="3172414" cy="1462527"/>
-        </p:xfrm>
-        <a:graphic>
-          <a:graphicData uri="http://schemas.openxmlformats.org/drawingml/2006/table">
-            <a:tbl>
-              <a:tblPr/>
-              <a:tblGrid>
-                <a:gridCol w="747619"/>
-                <a:gridCol w="1179630"/>
-                <a:gridCol w="1245165"/>
-              </a:tblGrid>
-              <a:tr h="418332">
-                <a:tc>
-                  <a:txBody>
-                    <a:bodyPr/>
-                    <a:lstStyle/>
-                    <a:p>
-                      <a:pPr algn="ctr" fontAlgn="ctr"/>
-                      <a:r>
-                        <a:rPr lang="es-AR" sz="1200" b="1" i="0" u="none" strike="noStrike" dirty="0" smtClean="0">
-                          <a:solidFill>
-                            <a:srgbClr val="000000"/>
-                          </a:solidFill>
-                          <a:latin typeface="+mj-lt"/>
-                        </a:rPr>
-                        <a:t>Ciclo</a:t>
-                      </a:r>
-                      <a:endParaRPr lang="es-AR" sz="1200" b="1" i="0" u="none" strike="noStrike" dirty="0">
-                        <a:solidFill>
-                          <a:srgbClr val="000000"/>
-                        </a:solidFill>
-                        <a:latin typeface="+mj-lt"/>
-                      </a:endParaRPr>
-                    </a:p>
-                  </a:txBody>
-                  <a:tcPr marL="9525" marR="9525" marT="9525" marB="0" anchor="ctr">
-                    <a:lnL w="12700" cap="flat" cmpd="sng" algn="ctr">
-                      <a:solidFill>
-                        <a:srgbClr val="000000"/>
-                      </a:solidFill>
-                      <a:prstDash val="solid"/>
-                      <a:round/>
-                      <a:headEnd type="none" w="med" len="med"/>
-                      <a:tailEnd type="none" w="med" len="med"/>
-                    </a:lnL>
-                    <a:lnR w="6350" cap="flat" cmpd="sng" algn="ctr">
-                      <a:solidFill>
-                        <a:srgbClr val="000000"/>
-                      </a:solidFill>
-                      <a:prstDash val="solid"/>
-                      <a:round/>
-                      <a:headEnd type="none" w="med" len="med"/>
-                      <a:tailEnd type="none" w="med" len="med"/>
-                    </a:lnR>
-                    <a:lnT w="12700" cap="flat" cmpd="sng" algn="ctr">
-                      <a:solidFill>
-                        <a:srgbClr val="000000"/>
-                      </a:solidFill>
-                      <a:prstDash val="solid"/>
-                      <a:round/>
-                      <a:headEnd type="none" w="med" len="med"/>
-                      <a:tailEnd type="none" w="med" len="med"/>
-                    </a:lnT>
-                    <a:lnB w="6350" cap="flat" cmpd="sng" algn="ctr">
-                      <a:solidFill>
-                        <a:srgbClr val="000000"/>
-                      </a:solidFill>
-                      <a:prstDash val="solid"/>
-                      <a:round/>
-                      <a:headEnd type="none" w="med" len="med"/>
-                      <a:tailEnd type="none" w="med" len="med"/>
-                    </a:lnB>
-                    <a:solidFill>
-                      <a:srgbClr val="F79646"/>
-                    </a:solidFill>
-                  </a:tcPr>
-                </a:tc>
-                <a:tc>
-                  <a:txBody>
-                    <a:bodyPr/>
-                    <a:lstStyle/>
-                    <a:p>
-                      <a:pPr algn="ctr" fontAlgn="ctr"/>
-                      <a:r>
-                        <a:rPr lang="es-AR" sz="1200" b="1" i="0" u="none" strike="noStrike" dirty="0">
-                          <a:solidFill>
-                            <a:srgbClr val="000000"/>
-                          </a:solidFill>
-                          <a:latin typeface="+mj-lt"/>
-                        </a:rPr>
-                        <a:t>Fecha de</a:t>
-                      </a:r>
-                      <a:br>
-                        <a:rPr lang="es-AR" sz="1200" b="1" i="0" u="none" strike="noStrike" dirty="0">
-                          <a:solidFill>
-                            <a:srgbClr val="000000"/>
-                          </a:solidFill>
-                          <a:latin typeface="+mj-lt"/>
-                        </a:rPr>
-                      </a:br>
-                      <a:r>
-                        <a:rPr lang="es-AR" sz="1200" b="1" i="0" u="none" strike="noStrike" dirty="0">
-                          <a:solidFill>
-                            <a:srgbClr val="000000"/>
-                          </a:solidFill>
-                          <a:latin typeface="+mj-lt"/>
-                        </a:rPr>
-                        <a:t>Prueba</a:t>
-                      </a:r>
-                    </a:p>
-                  </a:txBody>
-                  <a:tcPr marL="9525" marR="9525" marT="9525" marB="0" anchor="ctr">
-                    <a:lnL w="6350" cap="flat" cmpd="sng" algn="ctr">
-                      <a:solidFill>
-                        <a:srgbClr val="000000"/>
-                      </a:solidFill>
-                      <a:prstDash val="solid"/>
-                      <a:round/>
-                      <a:headEnd type="none" w="med" len="med"/>
-                      <a:tailEnd type="none" w="med" len="med"/>
-                    </a:lnL>
-                    <a:lnR w="6350" cap="flat" cmpd="sng" algn="ctr">
-                      <a:solidFill>
-                        <a:srgbClr val="000000"/>
-                      </a:solidFill>
-                      <a:prstDash val="solid"/>
-                      <a:round/>
-                      <a:headEnd type="none" w="med" len="med"/>
-                      <a:tailEnd type="none" w="med" len="med"/>
-                    </a:lnR>
-                    <a:lnT w="12700" cap="flat" cmpd="sng" algn="ctr">
-                      <a:solidFill>
-                        <a:srgbClr val="000000"/>
-                      </a:solidFill>
-                      <a:prstDash val="solid"/>
-                      <a:round/>
-                      <a:headEnd type="none" w="med" len="med"/>
-                      <a:tailEnd type="none" w="med" len="med"/>
-                    </a:lnT>
-                    <a:lnB w="6350" cap="flat" cmpd="sng" algn="ctr">
-                      <a:solidFill>
-                        <a:srgbClr val="000000"/>
-                      </a:solidFill>
-                      <a:prstDash val="solid"/>
-                      <a:round/>
-                      <a:headEnd type="none" w="med" len="med"/>
-                      <a:tailEnd type="none" w="med" len="med"/>
-                    </a:lnB>
-                    <a:solidFill>
-                      <a:srgbClr val="F79646"/>
-                    </a:solidFill>
-                  </a:tcPr>
-                </a:tc>
-                <a:tc>
-                  <a:txBody>
-                    <a:bodyPr/>
-                    <a:lstStyle/>
-                    <a:p>
-                      <a:pPr algn="ctr" fontAlgn="ctr"/>
-                      <a:r>
-                        <a:rPr lang="es-AR" sz="1200" b="1" i="0" u="none" strike="noStrike" dirty="0">
-                          <a:solidFill>
-                            <a:srgbClr val="000000"/>
-                          </a:solidFill>
-                          <a:latin typeface="+mj-lt"/>
-                        </a:rPr>
-                        <a:t>Resultado</a:t>
-                      </a:r>
-                    </a:p>
-                  </a:txBody>
-                  <a:tcPr marL="9525" marR="9525" marT="9525" marB="0" anchor="ctr">
-                    <a:lnL w="6350" cap="flat" cmpd="sng" algn="ctr">
-                      <a:solidFill>
-                        <a:srgbClr val="000000"/>
-                      </a:solidFill>
-                      <a:prstDash val="solid"/>
-                      <a:round/>
-                      <a:headEnd type="none" w="med" len="med"/>
-                      <a:tailEnd type="none" w="med" len="med"/>
-                    </a:lnL>
-                    <a:lnR w="12700" cap="flat" cmpd="sng" algn="ctr">
-                      <a:solidFill>
-                        <a:srgbClr val="000000"/>
-                      </a:solidFill>
-                      <a:prstDash val="solid"/>
-                      <a:round/>
-                      <a:headEnd type="none" w="med" len="med"/>
-                      <a:tailEnd type="none" w="med" len="med"/>
-                    </a:lnR>
-                    <a:lnT w="12700" cap="flat" cmpd="sng" algn="ctr">
-                      <a:solidFill>
-                        <a:srgbClr val="000000"/>
-                      </a:solidFill>
-                      <a:prstDash val="solid"/>
-                      <a:round/>
-                      <a:headEnd type="none" w="med" len="med"/>
-                      <a:tailEnd type="none" w="med" len="med"/>
-                    </a:lnT>
-                    <a:lnB w="6350" cap="flat" cmpd="sng" algn="ctr">
-                      <a:solidFill>
-                        <a:srgbClr val="000000"/>
-                      </a:solidFill>
-                      <a:prstDash val="solid"/>
-                      <a:round/>
-                      <a:headEnd type="none" w="med" len="med"/>
-                      <a:tailEnd type="none" w="med" len="med"/>
-                    </a:lnB>
-                    <a:solidFill>
-                      <a:srgbClr val="F79646"/>
-                    </a:solidFill>
-                  </a:tcPr>
-                </a:tc>
-              </a:tr>
-              <a:tr h="257826">
-                <a:tc>
-                  <a:txBody>
-                    <a:bodyPr/>
-                    <a:lstStyle/>
-                    <a:p>
-                      <a:pPr algn="ctr" fontAlgn="b"/>
-                      <a:r>
-                        <a:rPr kumimoji="0" lang="es-AR" sz="1200" kern="1200" dirty="0" smtClean="0">
-                          <a:solidFill>
-                            <a:schemeClr val="dk1"/>
-                          </a:solidFill>
-                          <a:latin typeface="+mn-lt"/>
-                          <a:ea typeface="+mn-ea"/>
-                          <a:cs typeface="+mn-cs"/>
-                        </a:rPr>
-                        <a:t>1</a:t>
-                      </a:r>
-                      <a:endParaRPr kumimoji="0" lang="es-AR" sz="1200" kern="1200" dirty="0">
-                        <a:solidFill>
-                          <a:schemeClr val="dk1"/>
-                        </a:solidFill>
-                        <a:latin typeface="+mn-lt"/>
-                        <a:ea typeface="+mn-ea"/>
-                        <a:cs typeface="+mn-cs"/>
-                      </a:endParaRPr>
-                    </a:p>
-                  </a:txBody>
-                  <a:tcPr marL="9525" marR="9525" marT="9525" marB="0" anchor="b">
-                    <a:lnL w="12700" cap="flat" cmpd="sng" algn="ctr">
-                      <a:solidFill>
-                        <a:srgbClr val="000000"/>
-                      </a:solidFill>
-                      <a:prstDash val="solid"/>
-                      <a:round/>
-                      <a:headEnd type="none" w="med" len="med"/>
-                      <a:tailEnd type="none" w="med" len="med"/>
-                    </a:lnL>
-                    <a:lnR>
-                      <a:noFill/>
-                    </a:lnR>
-                    <a:lnT w="6350" cap="flat" cmpd="sng" algn="ctr">
-                      <a:solidFill>
-                        <a:srgbClr val="000000"/>
-                      </a:solidFill>
-                      <a:prstDash val="solid"/>
-                      <a:round/>
-                      <a:headEnd type="none" w="med" len="med"/>
-                      <a:tailEnd type="none" w="med" len="med"/>
-                    </a:lnT>
-                    <a:lnB w="6350" cap="flat" cmpd="sng" algn="ctr">
-                      <a:solidFill>
-                        <a:srgbClr val="000000"/>
-                      </a:solidFill>
-                      <a:prstDash val="solid"/>
-                      <a:round/>
-                      <a:headEnd type="none" w="med" len="med"/>
-                      <a:tailEnd type="none" w="med" len="med"/>
-                    </a:lnB>
-                  </a:tcPr>
-                </a:tc>
-                <a:tc>
-                  <a:txBody>
-                    <a:bodyPr/>
-                    <a:lstStyle/>
-                    <a:p>
-                      <a:pPr algn="ctr" fontAlgn="b"/>
-                      <a:r>
-                        <a:rPr kumimoji="0" lang="es-AR" sz="1200" kern="1200" dirty="0">
-                          <a:solidFill>
-                            <a:schemeClr val="dk1"/>
-                          </a:solidFill>
-                          <a:latin typeface="+mn-lt"/>
-                          <a:ea typeface="+mn-ea"/>
-                          <a:cs typeface="+mn-cs"/>
-                        </a:rPr>
-                        <a:t>16/11/2010</a:t>
-                      </a:r>
-                    </a:p>
-                  </a:txBody>
-                  <a:tcPr marL="9525" marR="9525" marT="9525" marB="0" anchor="b">
-                    <a:lnL>
-                      <a:noFill/>
-                    </a:lnL>
-                    <a:lnR>
-                      <a:noFill/>
-                    </a:lnR>
-                    <a:lnT w="6350" cap="flat" cmpd="sng" algn="ctr">
-                      <a:solidFill>
-                        <a:srgbClr val="000000"/>
-                      </a:solidFill>
-                      <a:prstDash val="solid"/>
-                      <a:round/>
-                      <a:headEnd type="none" w="med" len="med"/>
-                      <a:tailEnd type="none" w="med" len="med"/>
-                    </a:lnT>
-                    <a:lnB w="6350" cap="flat" cmpd="sng" algn="ctr">
-                      <a:solidFill>
-                        <a:srgbClr val="000000"/>
-                      </a:solidFill>
-                      <a:prstDash val="solid"/>
-                      <a:round/>
-                      <a:headEnd type="none" w="med" len="med"/>
-                      <a:tailEnd type="none" w="med" len="med"/>
-                    </a:lnB>
-                  </a:tcPr>
-                </a:tc>
-                <a:tc>
-                  <a:txBody>
-                    <a:bodyPr/>
-                    <a:lstStyle/>
-                    <a:p>
-                      <a:pPr algn="ctr" fontAlgn="b"/>
-                      <a:r>
-                        <a:rPr kumimoji="0" lang="es-AR" sz="1200" kern="1200" dirty="0" smtClean="0">
-                          <a:solidFill>
-                            <a:schemeClr val="dk1"/>
-                          </a:solidFill>
-                          <a:latin typeface="+mn-lt"/>
-                          <a:ea typeface="+mn-ea"/>
-                          <a:cs typeface="+mn-cs"/>
-                        </a:rPr>
-                        <a:t>Rechazada</a:t>
-                      </a:r>
-                      <a:endParaRPr kumimoji="0" lang="es-AR" sz="1200" kern="1200" dirty="0">
-                        <a:solidFill>
-                          <a:schemeClr val="dk1"/>
-                        </a:solidFill>
-                        <a:latin typeface="+mn-lt"/>
-                        <a:ea typeface="+mn-ea"/>
-                        <a:cs typeface="+mn-cs"/>
-                      </a:endParaRPr>
-                    </a:p>
-                  </a:txBody>
-                  <a:tcPr marL="9525" marR="9525" marT="9525" marB="0" anchor="b">
-                    <a:lnL>
-                      <a:noFill/>
-                    </a:lnL>
-                    <a:lnR w="12700" cap="flat" cmpd="sng" algn="ctr">
-                      <a:solidFill>
-                        <a:srgbClr val="000000"/>
-                      </a:solidFill>
-                      <a:prstDash val="solid"/>
-                      <a:round/>
-                      <a:headEnd type="none" w="med" len="med"/>
-                      <a:tailEnd type="none" w="med" len="med"/>
-                    </a:lnR>
-                    <a:lnT w="6350" cap="flat" cmpd="sng" algn="ctr">
-                      <a:solidFill>
-                        <a:srgbClr val="000000"/>
-                      </a:solidFill>
-                      <a:prstDash val="solid"/>
-                      <a:round/>
-                      <a:headEnd type="none" w="med" len="med"/>
-                      <a:tailEnd type="none" w="med" len="med"/>
-                    </a:lnT>
-                    <a:lnB w="6350" cap="flat" cmpd="sng" algn="ctr">
-                      <a:solidFill>
-                        <a:srgbClr val="000000"/>
-                      </a:solidFill>
-                      <a:prstDash val="solid"/>
-                      <a:round/>
-                      <a:headEnd type="none" w="med" len="med"/>
-                      <a:tailEnd type="none" w="med" len="med"/>
-                    </a:lnB>
-                  </a:tcPr>
-                </a:tc>
-              </a:tr>
-              <a:tr h="257826">
-                <a:tc>
-                  <a:txBody>
-                    <a:bodyPr/>
-                    <a:lstStyle/>
-                    <a:p>
-                      <a:pPr algn="ctr" fontAlgn="b"/>
-                      <a:r>
-                        <a:rPr kumimoji="0" lang="es-AR" sz="1200" kern="1200" dirty="0" smtClean="0">
-                          <a:solidFill>
-                            <a:schemeClr val="dk1"/>
-                          </a:solidFill>
-                          <a:latin typeface="+mn-lt"/>
-                          <a:ea typeface="+mn-ea"/>
-                          <a:cs typeface="+mn-cs"/>
-                        </a:rPr>
-                        <a:t>2</a:t>
-                      </a:r>
-                      <a:endParaRPr kumimoji="0" lang="es-AR" sz="1200" kern="1200" dirty="0">
-                        <a:solidFill>
-                          <a:schemeClr val="dk1"/>
-                        </a:solidFill>
-                        <a:latin typeface="+mn-lt"/>
-                        <a:ea typeface="+mn-ea"/>
-                        <a:cs typeface="+mn-cs"/>
-                      </a:endParaRPr>
-                    </a:p>
-                  </a:txBody>
-                  <a:tcPr marL="9525" marR="9525" marT="9525" marB="0" anchor="b">
-                    <a:lnL w="12700" cap="flat" cmpd="sng" algn="ctr">
-                      <a:solidFill>
-                        <a:srgbClr val="000000"/>
-                      </a:solidFill>
-                      <a:prstDash val="solid"/>
-                      <a:round/>
-                      <a:headEnd type="none" w="med" len="med"/>
-                      <a:tailEnd type="none" w="med" len="med"/>
-                    </a:lnL>
-                    <a:lnR>
-                      <a:noFill/>
-                    </a:lnR>
-                    <a:lnT w="6350" cap="flat" cmpd="sng" algn="ctr">
-                      <a:solidFill>
-                        <a:srgbClr val="000000"/>
-                      </a:solidFill>
-                      <a:prstDash val="solid"/>
-                      <a:round/>
-                      <a:headEnd type="none" w="med" len="med"/>
-                      <a:tailEnd type="none" w="med" len="med"/>
-                    </a:lnT>
-                    <a:lnB w="6350" cap="flat" cmpd="sng" algn="ctr">
-                      <a:solidFill>
-                        <a:srgbClr val="000000"/>
-                      </a:solidFill>
-                      <a:prstDash val="solid"/>
-                      <a:round/>
-                      <a:headEnd type="none" w="med" len="med"/>
-                      <a:tailEnd type="none" w="med" len="med"/>
-                    </a:lnB>
-                  </a:tcPr>
-                </a:tc>
-                <a:tc>
-                  <a:txBody>
-                    <a:bodyPr/>
-                    <a:lstStyle/>
-                    <a:p>
-                      <a:pPr algn="ctr" fontAlgn="b"/>
-                      <a:r>
-                        <a:rPr kumimoji="0" lang="es-AR" sz="1200" kern="1200" dirty="0">
-                          <a:solidFill>
-                            <a:schemeClr val="dk1"/>
-                          </a:solidFill>
-                          <a:latin typeface="+mn-lt"/>
-                          <a:ea typeface="+mn-ea"/>
-                          <a:cs typeface="+mn-cs"/>
-                        </a:rPr>
-                        <a:t>21/01/2011</a:t>
-                      </a:r>
-                    </a:p>
-                  </a:txBody>
-                  <a:tcPr marL="9525" marR="9525" marT="9525" marB="0" anchor="b">
-                    <a:lnL>
-                      <a:noFill/>
-                    </a:lnL>
-                    <a:lnR>
-                      <a:noFill/>
-                    </a:lnR>
-                    <a:lnT w="6350" cap="flat" cmpd="sng" algn="ctr">
-                      <a:solidFill>
-                        <a:srgbClr val="000000"/>
-                      </a:solidFill>
-                      <a:prstDash val="solid"/>
-                      <a:round/>
-                      <a:headEnd type="none" w="med" len="med"/>
-                      <a:tailEnd type="none" w="med" len="med"/>
-                    </a:lnT>
-                    <a:lnB w="6350" cap="flat" cmpd="sng" algn="ctr">
-                      <a:solidFill>
-                        <a:srgbClr val="000000"/>
-                      </a:solidFill>
-                      <a:prstDash val="solid"/>
-                      <a:round/>
-                      <a:headEnd type="none" w="med" len="med"/>
-                      <a:tailEnd type="none" w="med" len="med"/>
-                    </a:lnB>
-                  </a:tcPr>
-                </a:tc>
-                <a:tc>
-                  <a:txBody>
-                    <a:bodyPr/>
-                    <a:lstStyle/>
-                    <a:p>
-                      <a:pPr algn="ctr" fontAlgn="b"/>
-                      <a:r>
-                        <a:rPr kumimoji="0" lang="es-AR" sz="1200" kern="1200" dirty="0" smtClean="0">
-                          <a:solidFill>
-                            <a:schemeClr val="dk1"/>
-                          </a:solidFill>
-                          <a:latin typeface="+mn-lt"/>
-                          <a:ea typeface="+mn-ea"/>
-                          <a:cs typeface="+mn-cs"/>
-                        </a:rPr>
-                        <a:t>Rechazada</a:t>
-                      </a:r>
-                      <a:endParaRPr kumimoji="0" lang="es-AR" sz="1200" kern="1200" dirty="0">
-                        <a:solidFill>
-                          <a:schemeClr val="dk1"/>
-                        </a:solidFill>
-                        <a:latin typeface="+mn-lt"/>
-                        <a:ea typeface="+mn-ea"/>
-                        <a:cs typeface="+mn-cs"/>
-                      </a:endParaRPr>
-                    </a:p>
-                  </a:txBody>
-                  <a:tcPr marL="9525" marR="9525" marT="9525" marB="0" anchor="b">
-                    <a:lnL>
-                      <a:noFill/>
-                    </a:lnL>
-                    <a:lnR w="12700" cap="flat" cmpd="sng" algn="ctr">
-                      <a:solidFill>
-                        <a:srgbClr val="000000"/>
-                      </a:solidFill>
-                      <a:prstDash val="solid"/>
-                      <a:round/>
-                      <a:headEnd type="none" w="med" len="med"/>
-                      <a:tailEnd type="none" w="med" len="med"/>
-                    </a:lnR>
-                    <a:lnT w="6350" cap="flat" cmpd="sng" algn="ctr">
-                      <a:solidFill>
-                        <a:srgbClr val="000000"/>
-                      </a:solidFill>
-                      <a:prstDash val="solid"/>
-                      <a:round/>
-                      <a:headEnd type="none" w="med" len="med"/>
-                      <a:tailEnd type="none" w="med" len="med"/>
-                    </a:lnT>
-                    <a:lnB w="6350" cap="flat" cmpd="sng" algn="ctr">
-                      <a:solidFill>
-                        <a:srgbClr val="000000"/>
-                      </a:solidFill>
-                      <a:prstDash val="solid"/>
-                      <a:round/>
-                      <a:headEnd type="none" w="med" len="med"/>
-                      <a:tailEnd type="none" w="med" len="med"/>
-                    </a:lnB>
-                  </a:tcPr>
-                </a:tc>
-              </a:tr>
-              <a:tr h="257826">
-                <a:tc>
-                  <a:txBody>
-                    <a:bodyPr/>
-                    <a:lstStyle/>
-                    <a:p>
-                      <a:pPr algn="ctr" fontAlgn="b"/>
-                      <a:r>
-                        <a:rPr kumimoji="0" lang="es-AR" sz="1200" kern="1200" dirty="0" smtClean="0">
-                          <a:solidFill>
-                            <a:schemeClr val="dk1"/>
-                          </a:solidFill>
-                          <a:latin typeface="+mn-lt"/>
-                          <a:ea typeface="+mn-ea"/>
-                          <a:cs typeface="+mn-cs"/>
-                        </a:rPr>
-                        <a:t>3</a:t>
-                      </a:r>
-                      <a:endParaRPr kumimoji="0" lang="es-AR" sz="1200" kern="1200" dirty="0">
-                        <a:solidFill>
-                          <a:schemeClr val="dk1"/>
-                        </a:solidFill>
-                        <a:latin typeface="+mn-lt"/>
-                        <a:ea typeface="+mn-ea"/>
-                        <a:cs typeface="+mn-cs"/>
-                      </a:endParaRPr>
-                    </a:p>
-                  </a:txBody>
-                  <a:tcPr marL="9525" marR="9525" marT="9525" marB="0" anchor="b">
-                    <a:lnL w="12700" cap="flat" cmpd="sng" algn="ctr">
-                      <a:solidFill>
-                        <a:srgbClr val="000000"/>
-                      </a:solidFill>
-                      <a:prstDash val="solid"/>
-                      <a:round/>
-                      <a:headEnd type="none" w="med" len="med"/>
-                      <a:tailEnd type="none" w="med" len="med"/>
-                    </a:lnL>
-                    <a:lnR>
-                      <a:noFill/>
-                    </a:lnR>
-                    <a:lnT w="6350" cap="flat" cmpd="sng" algn="ctr">
-                      <a:solidFill>
-                        <a:srgbClr val="000000"/>
-                      </a:solidFill>
-                      <a:prstDash val="solid"/>
-                      <a:round/>
-                      <a:headEnd type="none" w="med" len="med"/>
-                      <a:tailEnd type="none" w="med" len="med"/>
-                    </a:lnT>
-                    <a:lnB w="6350" cap="flat" cmpd="sng" algn="ctr">
-                      <a:solidFill>
-                        <a:srgbClr val="000000"/>
-                      </a:solidFill>
-                      <a:prstDash val="solid"/>
-                      <a:round/>
-                      <a:headEnd type="none" w="med" len="med"/>
-                      <a:tailEnd type="none" w="med" len="med"/>
-                    </a:lnB>
-                  </a:tcPr>
-                </a:tc>
-                <a:tc>
-                  <a:txBody>
-                    <a:bodyPr/>
-                    <a:lstStyle/>
-                    <a:p>
-                      <a:pPr algn="ctr" fontAlgn="b"/>
-                      <a:r>
-                        <a:rPr kumimoji="0" lang="es-AR" sz="1200" kern="1200" dirty="0">
-                          <a:solidFill>
-                            <a:schemeClr val="dk1"/>
-                          </a:solidFill>
-                          <a:latin typeface="+mn-lt"/>
-                          <a:ea typeface="+mn-ea"/>
-                          <a:cs typeface="+mn-cs"/>
-                        </a:rPr>
-                        <a:t>12/03/2011</a:t>
-                      </a:r>
-                    </a:p>
-                  </a:txBody>
-                  <a:tcPr marL="9525" marR="9525" marT="9525" marB="0" anchor="b">
-                    <a:lnL>
-                      <a:noFill/>
-                    </a:lnL>
-                    <a:lnR>
-                      <a:noFill/>
-                    </a:lnR>
-                    <a:lnT w="6350" cap="flat" cmpd="sng" algn="ctr">
-                      <a:solidFill>
-                        <a:srgbClr val="000000"/>
-                      </a:solidFill>
-                      <a:prstDash val="solid"/>
-                      <a:round/>
-                      <a:headEnd type="none" w="med" len="med"/>
-                      <a:tailEnd type="none" w="med" len="med"/>
-                    </a:lnT>
-                    <a:lnB w="6350" cap="flat" cmpd="sng" algn="ctr">
-                      <a:solidFill>
-                        <a:srgbClr val="000000"/>
-                      </a:solidFill>
-                      <a:prstDash val="solid"/>
-                      <a:round/>
-                      <a:headEnd type="none" w="med" len="med"/>
-                      <a:tailEnd type="none" w="med" len="med"/>
-                    </a:lnB>
-                  </a:tcPr>
-                </a:tc>
-                <a:tc>
-                  <a:txBody>
-                    <a:bodyPr/>
-                    <a:lstStyle/>
-                    <a:p>
-                      <a:pPr algn="ctr" fontAlgn="b"/>
-                      <a:r>
-                        <a:rPr kumimoji="0" lang="es-AR" sz="1200" kern="1200" dirty="0" smtClean="0">
-                          <a:solidFill>
-                            <a:schemeClr val="dk1"/>
-                          </a:solidFill>
-                          <a:latin typeface="+mn-lt"/>
-                          <a:ea typeface="+mn-ea"/>
-                          <a:cs typeface="+mn-cs"/>
-                        </a:rPr>
-                        <a:t>Rechazada</a:t>
-                      </a:r>
-                      <a:endParaRPr kumimoji="0" lang="es-AR" sz="1200" kern="1200" dirty="0">
-                        <a:solidFill>
-                          <a:schemeClr val="dk1"/>
-                        </a:solidFill>
-                        <a:latin typeface="+mn-lt"/>
-                        <a:ea typeface="+mn-ea"/>
-                        <a:cs typeface="+mn-cs"/>
-                      </a:endParaRPr>
-                    </a:p>
-                  </a:txBody>
-                  <a:tcPr marL="9525" marR="9525" marT="9525" marB="0" anchor="b">
-                    <a:lnL>
-                      <a:noFill/>
-                    </a:lnL>
-                    <a:lnR w="12700" cap="flat" cmpd="sng" algn="ctr">
-                      <a:solidFill>
-                        <a:srgbClr val="000000"/>
-                      </a:solidFill>
-                      <a:prstDash val="solid"/>
-                      <a:round/>
-                      <a:headEnd type="none" w="med" len="med"/>
-                      <a:tailEnd type="none" w="med" len="med"/>
-                    </a:lnR>
-                    <a:lnT w="6350" cap="flat" cmpd="sng" algn="ctr">
-                      <a:solidFill>
-                        <a:srgbClr val="000000"/>
-                      </a:solidFill>
-                      <a:prstDash val="solid"/>
-                      <a:round/>
-                      <a:headEnd type="none" w="med" len="med"/>
-                      <a:tailEnd type="none" w="med" len="med"/>
-                    </a:lnT>
-                    <a:lnB w="6350" cap="flat" cmpd="sng" algn="ctr">
-                      <a:solidFill>
-                        <a:srgbClr val="000000"/>
-                      </a:solidFill>
-                      <a:prstDash val="solid"/>
-                      <a:round/>
-                      <a:headEnd type="none" w="med" len="med"/>
-                      <a:tailEnd type="none" w="med" len="med"/>
-                    </a:lnB>
-                  </a:tcPr>
-                </a:tc>
-              </a:tr>
-              <a:tr h="270717">
-                <a:tc>
-                  <a:txBody>
-                    <a:bodyPr/>
-                    <a:lstStyle/>
-                    <a:p>
-                      <a:pPr algn="ctr" fontAlgn="b"/>
-                      <a:r>
-                        <a:rPr kumimoji="0" lang="es-AR" sz="1200" kern="1200" dirty="0" smtClean="0">
-                          <a:solidFill>
-                            <a:schemeClr val="dk1"/>
-                          </a:solidFill>
-                          <a:latin typeface="+mn-lt"/>
-                          <a:ea typeface="+mn-ea"/>
-                          <a:cs typeface="+mn-cs"/>
-                        </a:rPr>
-                        <a:t>4</a:t>
-                      </a:r>
-                      <a:endParaRPr kumimoji="0" lang="es-AR" sz="1200" kern="1200" dirty="0">
-                        <a:solidFill>
-                          <a:schemeClr val="dk1"/>
-                        </a:solidFill>
-                        <a:latin typeface="+mn-lt"/>
-                        <a:ea typeface="+mn-ea"/>
-                        <a:cs typeface="+mn-cs"/>
-                      </a:endParaRPr>
-                    </a:p>
-                  </a:txBody>
-                  <a:tcPr marL="9525" marR="9525" marT="9525" marB="0" anchor="b">
-                    <a:lnL w="12700" cap="flat" cmpd="sng" algn="ctr">
-                      <a:solidFill>
-                        <a:srgbClr val="000000"/>
-                      </a:solidFill>
-                      <a:prstDash val="solid"/>
-                      <a:round/>
-                      <a:headEnd type="none" w="med" len="med"/>
-                      <a:tailEnd type="none" w="med" len="med"/>
-                    </a:lnL>
-                    <a:lnR>
-                      <a:noFill/>
-                    </a:lnR>
-                    <a:lnT w="6350" cap="flat" cmpd="sng" algn="ctr">
-                      <a:solidFill>
-                        <a:srgbClr val="000000"/>
-                      </a:solidFill>
-                      <a:prstDash val="solid"/>
-                      <a:round/>
-                      <a:headEnd type="none" w="med" len="med"/>
-                      <a:tailEnd type="none" w="med" len="med"/>
-                    </a:lnT>
-                    <a:lnB w="12700" cap="flat" cmpd="sng" algn="ctr">
-                      <a:solidFill>
-                        <a:srgbClr val="000000"/>
-                      </a:solidFill>
-                      <a:prstDash val="solid"/>
-                      <a:round/>
-                      <a:headEnd type="none" w="med" len="med"/>
-                      <a:tailEnd type="none" w="med" len="med"/>
-                    </a:lnB>
-                  </a:tcPr>
-                </a:tc>
-                <a:tc>
-                  <a:txBody>
-                    <a:bodyPr/>
-                    <a:lstStyle/>
-                    <a:p>
-                      <a:pPr algn="ctr" fontAlgn="b"/>
-                      <a:r>
-                        <a:rPr kumimoji="0" lang="es-AR" sz="1200" kern="1200" dirty="0">
-                          <a:solidFill>
-                            <a:schemeClr val="dk1"/>
-                          </a:solidFill>
-                          <a:latin typeface="+mn-lt"/>
-                          <a:ea typeface="+mn-ea"/>
-                          <a:cs typeface="+mn-cs"/>
-                        </a:rPr>
-                        <a:t>08/04/2011</a:t>
-                      </a:r>
-                    </a:p>
-                  </a:txBody>
-                  <a:tcPr marL="9525" marR="9525" marT="9525" marB="0" anchor="b">
-                    <a:lnL>
-                      <a:noFill/>
-                    </a:lnL>
-                    <a:lnR>
-                      <a:noFill/>
-                    </a:lnR>
-                    <a:lnT w="6350" cap="flat" cmpd="sng" algn="ctr">
-                      <a:solidFill>
-                        <a:srgbClr val="000000"/>
-                      </a:solidFill>
-                      <a:prstDash val="solid"/>
-                      <a:round/>
-                      <a:headEnd type="none" w="med" len="med"/>
-                      <a:tailEnd type="none" w="med" len="med"/>
-                    </a:lnT>
-                    <a:lnB w="12700" cap="flat" cmpd="sng" algn="ctr">
-                      <a:solidFill>
-                        <a:srgbClr val="000000"/>
-                      </a:solidFill>
-                      <a:prstDash val="solid"/>
-                      <a:round/>
-                      <a:headEnd type="none" w="med" len="med"/>
-                      <a:tailEnd type="none" w="med" len="med"/>
-                    </a:lnB>
-                  </a:tcPr>
-                </a:tc>
-                <a:tc>
-                  <a:txBody>
-                    <a:bodyPr/>
-                    <a:lstStyle/>
-                    <a:p>
-                      <a:pPr algn="ctr" fontAlgn="b"/>
-                      <a:r>
-                        <a:rPr kumimoji="0" lang="es-AR" sz="1200" kern="1200" dirty="0">
-                          <a:solidFill>
-                            <a:schemeClr val="dk1"/>
-                          </a:solidFill>
-                          <a:latin typeface="+mn-lt"/>
-                          <a:ea typeface="+mn-ea"/>
-                          <a:cs typeface="+mn-cs"/>
-                        </a:rPr>
-                        <a:t>Aceptada</a:t>
-                      </a:r>
-                    </a:p>
-                  </a:txBody>
-                  <a:tcPr marL="9525" marR="9525" marT="9525" marB="0" anchor="b">
-                    <a:lnL>
-                      <a:noFill/>
-                    </a:lnL>
-                    <a:lnR w="12700" cap="flat" cmpd="sng" algn="ctr">
-                      <a:solidFill>
-                        <a:srgbClr val="000000"/>
-                      </a:solidFill>
-                      <a:prstDash val="solid"/>
-                      <a:round/>
-                      <a:headEnd type="none" w="med" len="med"/>
-                      <a:tailEnd type="none" w="med" len="med"/>
-                    </a:lnR>
-                    <a:lnT w="6350" cap="flat" cmpd="sng" algn="ctr">
-                      <a:solidFill>
-                        <a:srgbClr val="000000"/>
-                      </a:solidFill>
-                      <a:prstDash val="solid"/>
-                      <a:round/>
-                      <a:headEnd type="none" w="med" len="med"/>
-                      <a:tailEnd type="none" w="med" len="med"/>
-                    </a:lnT>
-                    <a:lnB w="12700" cap="flat" cmpd="sng" algn="ctr">
-                      <a:solidFill>
-                        <a:srgbClr val="000000"/>
-                      </a:solidFill>
-                      <a:prstDash val="solid"/>
-                      <a:round/>
-                      <a:headEnd type="none" w="med" len="med"/>
-                      <a:tailEnd type="none" w="med" len="med"/>
-                    </a:lnB>
-                  </a:tcPr>
-                </a:tc>
-              </a:tr>
-            </a:tbl>
-          </a:graphicData>
-        </a:graphic>
-      </p:graphicFrame>
-      <p:graphicFrame>
-        <p:nvGraphicFramePr>
-          <p:cNvPr id="16" name="15 Tabla"/>
-          <p:cNvGraphicFramePr>
-            <a:graphicFrameLocks noGrp="1"/>
-          </p:cNvGraphicFramePr>
-          <p:nvPr/>
-        </p:nvGraphicFramePr>
-        <p:xfrm>
-          <a:off x="12463185" y="2357430"/>
-          <a:ext cx="2643206" cy="857256"/>
-        </p:xfrm>
-        <a:graphic>
-          <a:graphicData uri="http://schemas.openxmlformats.org/drawingml/2006/table">
-            <a:tbl>
-              <a:tblPr firstRow="1" bandRow="1">
-                <a:tableStyleId>{22838BEF-8BB2-4498-84A7-C5851F593DF1}</a:tableStyleId>
-              </a:tblPr>
-              <a:tblGrid>
-                <a:gridCol w="1384536"/>
-                <a:gridCol w="667195"/>
-                <a:gridCol w="591475"/>
-              </a:tblGrid>
-              <a:tr h="285752">
-                <a:tc>
-                  <a:txBody>
-                    <a:bodyPr/>
-                    <a:lstStyle/>
-                    <a:p>
-                      <a:r>
-                        <a:rPr lang="es-AR" sz="1200" b="0" dirty="0" smtClean="0"/>
-                        <a:t>Incidentes</a:t>
-                      </a:r>
-                      <a:r>
-                        <a:rPr lang="es-AR" sz="1200" b="0" baseline="0" dirty="0" smtClean="0"/>
-                        <a:t> A</a:t>
-                      </a:r>
-                      <a:endParaRPr lang="es-AR" sz="1200" b="0" dirty="0"/>
-                    </a:p>
-                  </a:txBody>
-                  <a:tcPr/>
-                </a:tc>
-                <a:tc>
-                  <a:txBody>
-                    <a:bodyPr/>
-                    <a:lstStyle/>
-                    <a:p>
-                      <a:r>
-                        <a:rPr lang="es-AR" sz="1200" b="0" dirty="0" smtClean="0"/>
-                        <a:t>2%</a:t>
-                      </a:r>
-                      <a:endParaRPr lang="es-AR" sz="1200" b="0" dirty="0"/>
-                    </a:p>
-                  </a:txBody>
-                  <a:tcPr/>
-                </a:tc>
-                <a:tc>
-                  <a:txBody>
-                    <a:bodyPr/>
-                    <a:lstStyle/>
-                    <a:p>
-                      <a:r>
-                        <a:rPr lang="es-AR" sz="1200" b="0" dirty="0" smtClean="0"/>
-                        <a:t>8</a:t>
-                      </a:r>
-                      <a:endParaRPr lang="es-AR" sz="1200" b="0" dirty="0"/>
-                    </a:p>
-                  </a:txBody>
-                  <a:tcPr/>
-                </a:tc>
-              </a:tr>
-              <a:tr h="285752">
-                <a:tc>
-                  <a:txBody>
-                    <a:bodyPr/>
-                    <a:lstStyle/>
-                    <a:p>
-                      <a:r>
-                        <a:rPr lang="es-AR" sz="1200" dirty="0" smtClean="0"/>
-                        <a:t>Incidentes B</a:t>
-                      </a:r>
-                      <a:endParaRPr lang="es-AR" sz="1200" dirty="0"/>
-                    </a:p>
-                  </a:txBody>
-                  <a:tcPr/>
-                </a:tc>
-                <a:tc>
-                  <a:txBody>
-                    <a:bodyPr/>
-                    <a:lstStyle/>
-                    <a:p>
-                      <a:r>
-                        <a:rPr lang="es-AR" sz="1200" dirty="0" smtClean="0"/>
-                        <a:t>7%</a:t>
-                      </a:r>
-                      <a:endParaRPr lang="es-AR" sz="1200" dirty="0"/>
-                    </a:p>
-                  </a:txBody>
-                  <a:tcPr/>
-                </a:tc>
-                <a:tc>
-                  <a:txBody>
-                    <a:bodyPr/>
-                    <a:lstStyle/>
-                    <a:p>
-                      <a:r>
-                        <a:rPr lang="es-AR" sz="1200" dirty="0" smtClean="0"/>
-                        <a:t>27</a:t>
-                      </a:r>
-                      <a:endParaRPr lang="es-AR" sz="1200" dirty="0"/>
-                    </a:p>
-                  </a:txBody>
-                  <a:tcPr/>
-                </a:tc>
-              </a:tr>
-              <a:tr h="285752">
-                <a:tc>
-                  <a:txBody>
-                    <a:bodyPr/>
-                    <a:lstStyle/>
-                    <a:p>
-                      <a:r>
-                        <a:rPr lang="es-AR" sz="1200" dirty="0" smtClean="0"/>
-                        <a:t>Incidentes C</a:t>
-                      </a:r>
-                      <a:endParaRPr lang="es-AR" sz="1200" dirty="0"/>
-                    </a:p>
-                  </a:txBody>
-                  <a:tcPr/>
-                </a:tc>
-                <a:tc>
-                  <a:txBody>
-                    <a:bodyPr/>
-                    <a:lstStyle/>
-                    <a:p>
-                      <a:r>
-                        <a:rPr lang="es-AR" sz="1200" dirty="0" smtClean="0"/>
-                        <a:t>25%</a:t>
-                      </a:r>
-                      <a:endParaRPr lang="es-AR" sz="1200" dirty="0"/>
-                    </a:p>
-                  </a:txBody>
-                  <a:tcPr/>
-                </a:tc>
-                <a:tc>
-                  <a:txBody>
-                    <a:bodyPr/>
-                    <a:lstStyle/>
-                    <a:p>
-                      <a:r>
-                        <a:rPr lang="es-AR" sz="1200" dirty="0" smtClean="0"/>
-                        <a:t>96</a:t>
-                      </a:r>
-                      <a:endParaRPr lang="es-AR" sz="1200" dirty="0"/>
-                    </a:p>
-                  </a:txBody>
-                  <a:tcPr/>
-                </a:tc>
-              </a:tr>
-            </a:tbl>
-          </a:graphicData>
-        </a:graphic>
-      </p:graphicFrame>
-      <p:graphicFrame>
-        <p:nvGraphicFramePr>
-          <p:cNvPr id="17" name="16 Tabla"/>
-          <p:cNvGraphicFramePr>
-            <a:graphicFrameLocks noGrp="1"/>
-          </p:cNvGraphicFramePr>
-          <p:nvPr/>
-        </p:nvGraphicFramePr>
-        <p:xfrm>
-          <a:off x="12320309" y="3534734"/>
-          <a:ext cx="2643206" cy="822960"/>
-        </p:xfrm>
-        <a:graphic>
-          <a:graphicData uri="http://schemas.openxmlformats.org/drawingml/2006/table">
-            <a:tbl>
-              <a:tblPr firstRow="1" bandRow="1">
-                <a:tableStyleId>{22838BEF-8BB2-4498-84A7-C5851F593DF1}</a:tableStyleId>
-              </a:tblPr>
-              <a:tblGrid>
-                <a:gridCol w="1384536"/>
-                <a:gridCol w="667195"/>
-                <a:gridCol w="591475"/>
-              </a:tblGrid>
-              <a:tr h="261939">
-                <a:tc>
-                  <a:txBody>
-                    <a:bodyPr/>
-                    <a:lstStyle/>
-                    <a:p>
-                      <a:r>
-                        <a:rPr lang="es-AR" sz="1200" b="0" dirty="0" smtClean="0"/>
-                        <a:t>Incidentes</a:t>
-                      </a:r>
-                      <a:r>
-                        <a:rPr lang="es-AR" sz="1200" b="0" baseline="0" dirty="0" smtClean="0"/>
-                        <a:t> A</a:t>
-                      </a:r>
-                      <a:endParaRPr lang="es-AR" sz="1200" b="0" dirty="0"/>
-                    </a:p>
-                  </a:txBody>
-                  <a:tcPr/>
-                </a:tc>
-                <a:tc>
-                  <a:txBody>
-                    <a:bodyPr/>
-                    <a:lstStyle/>
-                    <a:p>
-                      <a:r>
-                        <a:rPr lang="es-AR" sz="1200" b="0" dirty="0" smtClean="0"/>
-                        <a:t>0%</a:t>
-                      </a:r>
-                      <a:endParaRPr lang="es-AR" sz="1200" b="0" dirty="0"/>
-                    </a:p>
-                  </a:txBody>
-                  <a:tcPr/>
-                </a:tc>
-                <a:tc>
-                  <a:txBody>
-                    <a:bodyPr/>
-                    <a:lstStyle/>
-                    <a:p>
-                      <a:r>
-                        <a:rPr lang="es-AR" sz="1200" b="0" dirty="0" smtClean="0"/>
-                        <a:t>0</a:t>
-                      </a:r>
-                      <a:endParaRPr lang="es-AR" sz="1200" b="0" dirty="0"/>
-                    </a:p>
-                  </a:txBody>
-                  <a:tcPr/>
-                </a:tc>
-              </a:tr>
-              <a:tr h="261939">
-                <a:tc>
-                  <a:txBody>
-                    <a:bodyPr/>
-                    <a:lstStyle/>
-                    <a:p>
-                      <a:r>
-                        <a:rPr lang="es-AR" sz="1200" dirty="0" smtClean="0"/>
-                        <a:t>Incidentes B</a:t>
-                      </a:r>
-                      <a:endParaRPr lang="es-AR" sz="1200" b="1" dirty="0"/>
-                    </a:p>
-                  </a:txBody>
-                  <a:tcPr/>
-                </a:tc>
-                <a:tc>
-                  <a:txBody>
-                    <a:bodyPr/>
-                    <a:lstStyle/>
-                    <a:p>
-                      <a:r>
-                        <a:rPr lang="es-AR" sz="1200" dirty="0" smtClean="0"/>
-                        <a:t>2%</a:t>
-                      </a:r>
-                      <a:endParaRPr lang="es-AR" sz="1200" dirty="0"/>
-                    </a:p>
-                  </a:txBody>
-                  <a:tcPr/>
-                </a:tc>
-                <a:tc>
-                  <a:txBody>
-                    <a:bodyPr/>
-                    <a:lstStyle/>
-                    <a:p>
-                      <a:r>
-                        <a:rPr lang="es-AR" sz="1200" dirty="0" smtClean="0"/>
-                        <a:t>8</a:t>
-                      </a:r>
-                      <a:endParaRPr lang="es-AR" sz="1200" dirty="0"/>
-                    </a:p>
-                  </a:txBody>
-                  <a:tcPr/>
-                </a:tc>
-              </a:tr>
-              <a:tr h="261939">
-                <a:tc>
-                  <a:txBody>
-                    <a:bodyPr/>
-                    <a:lstStyle/>
-                    <a:p>
-                      <a:r>
-                        <a:rPr lang="es-AR" sz="1200" dirty="0" smtClean="0"/>
-                        <a:t>Incidentes C</a:t>
-                      </a:r>
-                      <a:endParaRPr lang="es-AR" sz="1200" dirty="0"/>
-                    </a:p>
-                  </a:txBody>
-                  <a:tcPr/>
-                </a:tc>
-                <a:tc>
-                  <a:txBody>
-                    <a:bodyPr/>
-                    <a:lstStyle/>
-                    <a:p>
-                      <a:r>
-                        <a:rPr lang="es-AR" sz="1200" dirty="0" smtClean="0"/>
-                        <a:t>10%</a:t>
-                      </a:r>
-                      <a:endParaRPr lang="es-AR" sz="1200" dirty="0"/>
-                    </a:p>
-                  </a:txBody>
-                  <a:tcPr/>
-                </a:tc>
-                <a:tc>
-                  <a:txBody>
-                    <a:bodyPr/>
-                    <a:lstStyle/>
-                    <a:p>
-                      <a:r>
-                        <a:rPr lang="es-AR" sz="1200" dirty="0" smtClean="0"/>
-                        <a:t>38</a:t>
-                      </a:r>
-                      <a:endParaRPr lang="es-AR" sz="1200" dirty="0"/>
-                    </a:p>
-                  </a:txBody>
-                  <a:tcPr/>
-                </a:tc>
-              </a:tr>
-            </a:tbl>
-          </a:graphicData>
-        </a:graphic>
-      </p:graphicFrame>
       <p:pic>
         <p:nvPicPr>
-          <p:cNvPr id="14" name="Picture 3" descr="G:\reserbar-logo-sfondo.tif"/>
+          <p:cNvPr id="5" name="Picture 3" descr="G:\reserbar-logo-sfondo.tif"/>
           <p:cNvPicPr>
             <a:picLocks noChangeAspect="1" noChangeArrowheads="1"/>
           </p:cNvPicPr>
@@ -29511,12 +29883,288 @@
           <a:noFill/>
         </p:spPr>
       </p:pic>
+      <p:pic>
+        <p:nvPicPr>
+          <p:cNvPr id="1026" name="Picture 2" descr="C:\Users\macherep\Desktop\pivotal1.png"/>
+          <p:cNvPicPr>
+            <a:picLocks noChangeAspect="1" noChangeArrowheads="1"/>
+          </p:cNvPicPr>
+          <p:nvPr/>
+        </p:nvPicPr>
+        <p:blipFill>
+          <a:blip r:embed="rId3" cstate="print"/>
+          <a:srcRect/>
+          <a:stretch>
+            <a:fillRect/>
+          </a:stretch>
+        </p:blipFill>
+        <p:spPr bwMode="auto">
+          <a:xfrm>
+            <a:off x="857224" y="1857364"/>
+            <a:ext cx="7951432" cy="3573467"/>
+          </a:xfrm>
+          <a:prstGeom prst="rect">
+            <a:avLst/>
+          </a:prstGeom>
+          <a:noFill/>
+        </p:spPr>
+      </p:pic>
+      <p:sp>
+        <p:nvSpPr>
+          <p:cNvPr id="6" name="5 Llamada rectangular redondeada"/>
+          <p:cNvSpPr/>
+          <p:nvPr/>
+        </p:nvSpPr>
+        <p:spPr>
+          <a:xfrm>
+            <a:off x="9286908" y="1428736"/>
+            <a:ext cx="1714512" cy="357190"/>
+          </a:xfrm>
+          <a:prstGeom prst="wedgeRoundRectCallout">
+            <a:avLst>
+              <a:gd name="adj1" fmla="val -48305"/>
+              <a:gd name="adj2" fmla="val 183124"/>
+              <a:gd name="adj3" fmla="val 16667"/>
+            </a:avLst>
+          </a:prstGeom>
+        </p:spPr>
+        <p:style>
+          <a:lnRef idx="2">
+            <a:schemeClr val="accent1">
+              <a:shade val="50000"/>
+            </a:schemeClr>
+          </a:lnRef>
+          <a:fillRef idx="1">
+            <a:schemeClr val="accent1"/>
+          </a:fillRef>
+          <a:effectRef idx="0">
+            <a:schemeClr val="accent1"/>
+          </a:effectRef>
+          <a:fontRef idx="minor">
+            <a:schemeClr val="lt1"/>
+          </a:fontRef>
+        </p:style>
+        <p:txBody>
+          <a:bodyPr rtlCol="0" anchor="ctr"/>
+          <a:lstStyle/>
+          <a:p>
+            <a:pPr algn="ctr"/>
+            <a:r>
+              <a:rPr lang="es-AR" sz="1600" dirty="0" smtClean="0"/>
+              <a:t>Agregar tarea</a:t>
+            </a:r>
+            <a:endParaRPr lang="es-AR" sz="1600" dirty="0"/>
+          </a:p>
+        </p:txBody>
+      </p:sp>
+      <p:sp>
+        <p:nvSpPr>
+          <p:cNvPr id="8" name="7 Llamada rectangular redondeada"/>
+          <p:cNvSpPr/>
+          <p:nvPr/>
+        </p:nvSpPr>
+        <p:spPr>
+          <a:xfrm>
+            <a:off x="1285852" y="5500702"/>
+            <a:ext cx="1857388" cy="571504"/>
+          </a:xfrm>
+          <a:prstGeom prst="wedgeRoundRectCallout">
+            <a:avLst>
+              <a:gd name="adj1" fmla="val -39384"/>
+              <a:gd name="adj2" fmla="val -120356"/>
+              <a:gd name="adj3" fmla="val 16667"/>
+            </a:avLst>
+          </a:prstGeom>
+        </p:spPr>
+        <p:style>
+          <a:lnRef idx="2">
+            <a:schemeClr val="accent1">
+              <a:shade val="50000"/>
+            </a:schemeClr>
+          </a:lnRef>
+          <a:fillRef idx="1">
+            <a:schemeClr val="accent1"/>
+          </a:fillRef>
+          <a:effectRef idx="0">
+            <a:schemeClr val="accent1"/>
+          </a:effectRef>
+          <a:fontRef idx="minor">
+            <a:schemeClr val="lt1"/>
+          </a:fontRef>
+        </p:style>
+        <p:txBody>
+          <a:bodyPr rtlCol="0" anchor="ctr"/>
+          <a:lstStyle/>
+          <a:p>
+            <a:pPr algn="ctr"/>
+            <a:r>
+              <a:rPr lang="es-AR" sz="1600" dirty="0" err="1" smtClean="0"/>
+              <a:t>Current</a:t>
+            </a:r>
+            <a:r>
+              <a:rPr lang="es-AR" sz="1600" dirty="0" smtClean="0"/>
+              <a:t>!</a:t>
+            </a:r>
+            <a:endParaRPr lang="es-AR" sz="1600" dirty="0"/>
+          </a:p>
+        </p:txBody>
+      </p:sp>
+      <p:sp>
+        <p:nvSpPr>
+          <p:cNvPr id="9" name="8 Llamada rectangular redondeada"/>
+          <p:cNvSpPr/>
+          <p:nvPr/>
+        </p:nvSpPr>
+        <p:spPr>
+          <a:xfrm>
+            <a:off x="3214678" y="5500702"/>
+            <a:ext cx="1928826" cy="571504"/>
+          </a:xfrm>
+          <a:prstGeom prst="wedgeRoundRectCallout">
+            <a:avLst>
+              <a:gd name="adj1" fmla="val -38893"/>
+              <a:gd name="adj2" fmla="val -124165"/>
+              <a:gd name="adj3" fmla="val 16667"/>
+            </a:avLst>
+          </a:prstGeom>
+        </p:spPr>
+        <p:style>
+          <a:lnRef idx="2">
+            <a:schemeClr val="accent1">
+              <a:shade val="50000"/>
+            </a:schemeClr>
+          </a:lnRef>
+          <a:fillRef idx="1">
+            <a:schemeClr val="accent1"/>
+          </a:fillRef>
+          <a:effectRef idx="0">
+            <a:schemeClr val="accent1"/>
+          </a:effectRef>
+          <a:fontRef idx="minor">
+            <a:schemeClr val="lt1"/>
+          </a:fontRef>
+        </p:style>
+        <p:txBody>
+          <a:bodyPr rtlCol="0" anchor="ctr"/>
+          <a:lstStyle/>
+          <a:p>
+            <a:pPr algn="ctr"/>
+            <a:r>
+              <a:rPr lang="es-AR" sz="1600" dirty="0" err="1" smtClean="0"/>
+              <a:t>BackLog</a:t>
+            </a:r>
+            <a:endParaRPr lang="es-AR" sz="1600" dirty="0"/>
+          </a:p>
+        </p:txBody>
+      </p:sp>
+      <p:sp>
+        <p:nvSpPr>
+          <p:cNvPr id="10" name="9 Llamada rectangular redondeada"/>
+          <p:cNvSpPr/>
+          <p:nvPr/>
+        </p:nvSpPr>
+        <p:spPr>
+          <a:xfrm>
+            <a:off x="5214942" y="5500702"/>
+            <a:ext cx="1928826" cy="571504"/>
+          </a:xfrm>
+          <a:prstGeom prst="wedgeRoundRectCallout">
+            <a:avLst>
+              <a:gd name="adj1" fmla="val -38893"/>
+              <a:gd name="adj2" fmla="val -124165"/>
+              <a:gd name="adj3" fmla="val 16667"/>
+            </a:avLst>
+          </a:prstGeom>
+        </p:spPr>
+        <p:style>
+          <a:lnRef idx="2">
+            <a:schemeClr val="accent1">
+              <a:shade val="50000"/>
+            </a:schemeClr>
+          </a:lnRef>
+          <a:fillRef idx="1">
+            <a:schemeClr val="accent1"/>
+          </a:fillRef>
+          <a:effectRef idx="0">
+            <a:schemeClr val="accent1"/>
+          </a:effectRef>
+          <a:fontRef idx="minor">
+            <a:schemeClr val="lt1"/>
+          </a:fontRef>
+        </p:style>
+        <p:txBody>
+          <a:bodyPr rtlCol="0" anchor="ctr"/>
+          <a:lstStyle/>
+          <a:p>
+            <a:pPr algn="ctr"/>
+            <a:r>
+              <a:rPr lang="es-AR" sz="1600" dirty="0" err="1" smtClean="0"/>
+              <a:t>IceBox</a:t>
+            </a:r>
+            <a:endParaRPr lang="es-AR" sz="1600" dirty="0"/>
+          </a:p>
+        </p:txBody>
+      </p:sp>
+      <p:sp>
+        <p:nvSpPr>
+          <p:cNvPr id="11" name="10 Llamada rectangular redondeada"/>
+          <p:cNvSpPr/>
+          <p:nvPr/>
+        </p:nvSpPr>
+        <p:spPr>
+          <a:xfrm>
+            <a:off x="7072330" y="5500702"/>
+            <a:ext cx="1928826" cy="571504"/>
+          </a:xfrm>
+          <a:prstGeom prst="wedgeRoundRectCallout">
+            <a:avLst>
+              <a:gd name="adj1" fmla="val -38893"/>
+              <a:gd name="adj2" fmla="val -124165"/>
+              <a:gd name="adj3" fmla="val 16667"/>
+            </a:avLst>
+          </a:prstGeom>
+        </p:spPr>
+        <p:style>
+          <a:lnRef idx="2">
+            <a:schemeClr val="accent1">
+              <a:shade val="50000"/>
+            </a:schemeClr>
+          </a:lnRef>
+          <a:fillRef idx="1">
+            <a:schemeClr val="accent1"/>
+          </a:fillRef>
+          <a:effectRef idx="0">
+            <a:schemeClr val="accent1"/>
+          </a:effectRef>
+          <a:fontRef idx="minor">
+            <a:schemeClr val="lt1"/>
+          </a:fontRef>
+        </p:style>
+        <p:txBody>
+          <a:bodyPr rtlCol="0" anchor="ctr"/>
+          <a:lstStyle/>
+          <a:p>
+            <a:pPr algn="ctr"/>
+            <a:r>
+              <a:rPr lang="es-AR" sz="1600" dirty="0" smtClean="0"/>
+              <a:t>My </a:t>
+            </a:r>
+            <a:r>
+              <a:rPr lang="es-AR" sz="1600" dirty="0" err="1" smtClean="0"/>
+              <a:t>Work</a:t>
+            </a:r>
+            <a:endParaRPr lang="es-AR" sz="1600" dirty="0"/>
+          </a:p>
+        </p:txBody>
+      </p:sp>
     </p:spTree>
   </p:cSld>
   <p:clrMapOvr>
     <a:masterClrMapping/>
   </p:clrMapOvr>
-  <p:transition advTm="20000"/>
+  <p:transition advTm="20000">
+    <p:fade thruBlk="1"/>
+  </p:transition>
   <p:timing>
     <p:tnLst>
       <p:par>
@@ -29543,7 +30191,7 @@
                                     <p:cond delay="0"/>
                                   </p:stCondLst>
                                   <p:childTnLst>
-                                    <p:animMotion origin="layout" path="M 5.55556E-7 2.22222E-6 L -0.92448 2.22222E-6 " pathEditMode="relative" rAng="0" ptsTypes="AA">
+                                    <p:animMotion origin="layout" path="M 5E-6 7.40741E-7 L -0.29445 7.40741E-7 " pathEditMode="relative" rAng="0" ptsTypes="AA">
                                       <p:cBhvr>
                                         <p:cTn id="6" dur="2000" fill="hold"/>
                                         <p:tgtEl>
@@ -29554,29 +30202,7 @@
                                           <p:attrName>ppt_y</p:attrName>
                                         </p:attrNameLst>
                                       </p:cBhvr>
-                                      <p:rCtr x="-462" y="0"/>
-                                    </p:animMotion>
-                                  </p:childTnLst>
-                                </p:cTn>
-                              </p:par>
-                              <p:par>
-                                <p:cTn id="7" presetID="35" presetClass="path" presetSubtype="0" accel="50000" decel="50000" fill="hold" grpId="0" nodeType="withEffect">
-                                  <p:stCondLst>
-                                    <p:cond delay="0"/>
-                                  </p:stCondLst>
-                                  <p:childTnLst>
-                                    <p:animMotion origin="layout" path="M -1.11111E-6 -3.7037E-7 L -0.80104 -3.7037E-7 " pathEditMode="relative" rAng="0" ptsTypes="AA">
-                                      <p:cBhvr>
-                                        <p:cTn id="8" dur="2000" fill="hold"/>
-                                        <p:tgtEl>
-                                          <p:spTgt spid="7"/>
-                                        </p:tgtEl>
-                                        <p:attrNameLst>
-                                          <p:attrName>ppt_x</p:attrName>
-                                          <p:attrName>ppt_y</p:attrName>
-                                        </p:attrNameLst>
-                                      </p:cBhvr>
-                                      <p:rCtr x="-401" y="0"/>
+                                      <p:rCtr x="-147" y="0"/>
                                     </p:animMotion>
                                   </p:childTnLst>
                                 </p:cTn>
@@ -29584,61 +30210,74 @@
                             </p:childTnLst>
                           </p:cTn>
                         </p:par>
-                      </p:childTnLst>
-                    </p:cTn>
-                  </p:par>
-                  <p:par>
-                    <p:cTn id="9" fill="hold">
-                      <p:stCondLst>
-                        <p:cond delay="indefinite"/>
-                      </p:stCondLst>
-                      <p:childTnLst>
                         <p:par>
-                          <p:cTn id="10" fill="hold">
+                          <p:cTn id="7" fill="hold">
                             <p:stCondLst>
-                              <p:cond delay="0"/>
+                              <p:cond delay="2000"/>
                             </p:stCondLst>
                             <p:childTnLst>
                               <p:par>
-                                <p:cTn id="11" presetID="35" presetClass="path" presetSubtype="0" accel="50000" decel="50000" fill="hold" grpId="0" nodeType="clickEffect">
+                                <p:cTn id="8" presetID="4" presetClass="exit" presetSubtype="16" fill="hold" grpId="1" nodeType="afterEffect">
+                                  <p:stCondLst>
+                                    <p:cond delay="1500"/>
+                                  </p:stCondLst>
+                                  <p:childTnLst>
+                                    <p:animEffect transition="out" filter="box(in)">
+                                      <p:cBhvr>
+                                        <p:cTn id="9" dur="500"/>
+                                        <p:tgtEl>
+                                          <p:spTgt spid="6"/>
+                                        </p:tgtEl>
+                                      </p:cBhvr>
+                                    </p:animEffect>
+                                    <p:set>
+                                      <p:cBhvr>
+                                        <p:cTn id="10" dur="1" fill="hold">
+                                          <p:stCondLst>
+                                            <p:cond delay="499"/>
+                                          </p:stCondLst>
+                                        </p:cTn>
+                                        <p:tgtEl>
+                                          <p:spTgt spid="6"/>
+                                        </p:tgtEl>
+                                        <p:attrNameLst>
+                                          <p:attrName>style.visibility</p:attrName>
+                                        </p:attrNameLst>
+                                      </p:cBhvr>
+                                      <p:to>
+                                        <p:strVal val="hidden"/>
+                                      </p:to>
+                                    </p:set>
+                                  </p:childTnLst>
+                                </p:cTn>
+                              </p:par>
+                            </p:childTnLst>
+                          </p:cTn>
+                        </p:par>
+                        <p:par>
+                          <p:cTn id="11" fill="hold">
+                            <p:stCondLst>
+                              <p:cond delay="4000"/>
+                            </p:stCondLst>
+                            <p:childTnLst>
+                              <p:par>
+                                <p:cTn id="12" presetID="64" presetClass="path" presetSubtype="0" accel="50000" decel="50000" fill="hold" nodeType="afterEffect">
                                   <p:stCondLst>
                                     <p:cond delay="0"/>
                                   </p:stCondLst>
                                   <p:childTnLst>
-                                    <p:animMotion origin="layout" path="M -3.61111E-6 -4.44444E-6 L -0.89618 -4.44444E-6 " pathEditMode="relative" rAng="0" ptsTypes="AA">
+                                    <p:animMotion origin="layout" path="M -2.22222E-6 0.03889 L -2.22222E-6 -0.03449 " pathEditMode="relative" rAng="0" ptsTypes="AA">
                                       <p:cBhvr>
-                                        <p:cTn id="12" dur="2000" fill="hold"/>
+                                        <p:cTn id="13" dur="2000" fill="hold"/>
                                         <p:tgtEl>
-                                          <p:spTgt spid="8"/>
+                                          <p:spTgt spid="1026"/>
                                         </p:tgtEl>
                                         <p:attrNameLst>
                                           <p:attrName>ppt_x</p:attrName>
                                           <p:attrName>ppt_y</p:attrName>
                                         </p:attrNameLst>
                                       </p:cBhvr>
-                                      <p:rCtr x="-448" y="0"/>
-                                    </p:animMotion>
-                                  </p:childTnLst>
-                                </p:cTn>
-                              </p:par>
-                              <p:par>
-                                <p:cTn id="13" presetID="35" presetClass="path" presetSubtype="0" accel="50000" decel="50000" fill="hold" nodeType="withEffect">
-                                  <p:stCondLst>
-                                    <p:cond delay="0"/>
-                                  </p:stCondLst>
-                                  <p:childTnLst>
-                                    <p:animMotion origin="layout" path="M 4.72222E-6 0 L -0.92084 0 " pathEditMode="relative" rAng="0" ptsTypes="AA">
-                                      <p:cBhvr>
-                                        <p:cTn id="14" dur="2000" fill="hold"/>
-                                        <p:tgtEl>
-                                          <p:spTgt spid="16"/>
-                                        </p:tgtEl>
-                                        <p:attrNameLst>
-                                          <p:attrName>ppt_x</p:attrName>
-                                          <p:attrName>ppt_y</p:attrName>
-                                        </p:attrNameLst>
-                                      </p:cBhvr>
-                                      <p:rCtr x="-460" y="0"/>
+                                      <p:rCtr x="0" y="-37"/>
                                     </p:animMotion>
                                   </p:childTnLst>
                                 </p:cTn>
@@ -29646,124 +30285,428 @@
                             </p:childTnLst>
                           </p:cTn>
                         </p:par>
-                      </p:childTnLst>
-                    </p:cTn>
-                  </p:par>
-                  <p:par>
-                    <p:cTn id="15" fill="hold">
-                      <p:stCondLst>
-                        <p:cond delay="indefinite"/>
-                      </p:stCondLst>
-                      <p:childTnLst>
                         <p:par>
-                          <p:cTn id="16" fill="hold">
+                          <p:cTn id="14" fill="hold">
                             <p:stCondLst>
-                              <p:cond delay="0"/>
+                              <p:cond delay="6000"/>
                             </p:stCondLst>
                             <p:childTnLst>
                               <p:par>
-                                <p:cTn id="17" presetID="35" presetClass="path" presetSubtype="0" accel="50000" decel="50000" fill="hold" grpId="0" nodeType="clickEffect">
+                                <p:cTn id="15" presetID="5" presetClass="entr" presetSubtype="10" fill="hold" grpId="0" nodeType="afterEffect">
                                   <p:stCondLst>
                                     <p:cond delay="0"/>
                                   </p:stCondLst>
                                   <p:childTnLst>
-                                    <p:animMotion origin="layout" path="M -4.16667E-6 -7.40741E-7 L -0.90954 -7.40741E-7 " pathEditMode="relative" rAng="0" ptsTypes="AA">
+                                    <p:set>
                                       <p:cBhvr>
-                                        <p:cTn id="18" dur="2000" fill="hold"/>
+                                        <p:cTn id="16" dur="1" fill="hold">
+                                          <p:stCondLst>
+                                            <p:cond delay="0"/>
+                                          </p:stCondLst>
+                                        </p:cTn>
                                         <p:tgtEl>
-                                          <p:spTgt spid="10"/>
+                                          <p:spTgt spid="8"/>
                                         </p:tgtEl>
                                         <p:attrNameLst>
-                                          <p:attrName>ppt_x</p:attrName>
-                                          <p:attrName>ppt_y</p:attrName>
+                                          <p:attrName>style.visibility</p:attrName>
                                         </p:attrNameLst>
                                       </p:cBhvr>
-                                      <p:rCtr x="-455" y="0"/>
-                                    </p:animMotion>
-                                  </p:childTnLst>
-                                </p:cTn>
-                              </p:par>
-                              <p:par>
-                                <p:cTn id="19" presetID="35" presetClass="path" presetSubtype="0" accel="50000" decel="50000" fill="hold" nodeType="withEffect">
-                                  <p:stCondLst>
-                                    <p:cond delay="0"/>
-                                  </p:stCondLst>
-                                  <p:childTnLst>
-                                    <p:animMotion origin="layout" path="M -2.77778E-7 -2.96296E-6 L -0.92101 -2.96296E-6 " pathEditMode="relative" rAng="0" ptsTypes="AA">
+                                      <p:to>
+                                        <p:strVal val="visible"/>
+                                      </p:to>
+                                    </p:set>
+                                    <p:animEffect transition="in" filter="checkerboard(across)">
                                       <p:cBhvr>
-                                        <p:cTn id="20" dur="2000" fill="hold"/>
+                                        <p:cTn id="17" dur="500"/>
                                         <p:tgtEl>
-                                          <p:spTgt spid="17"/>
+                                          <p:spTgt spid="8"/>
                                         </p:tgtEl>
-                                        <p:attrNameLst>
-                                          <p:attrName>ppt_x</p:attrName>
-                                          <p:attrName>ppt_y</p:attrName>
-                                        </p:attrNameLst>
                                       </p:cBhvr>
-                                      <p:rCtr x="-461" y="0"/>
-                                    </p:animMotion>
+                                    </p:animEffect>
                                   </p:childTnLst>
                                 </p:cTn>
                               </p:par>
                             </p:childTnLst>
                           </p:cTn>
                         </p:par>
-                      </p:childTnLst>
-                    </p:cTn>
-                  </p:par>
-                  <p:par>
-                    <p:cTn id="21" fill="hold">
-                      <p:stCondLst>
-                        <p:cond delay="indefinite"/>
-                      </p:stCondLst>
-                      <p:childTnLst>
+                        <p:par>
+                          <p:cTn id="18" fill="hold">
+                            <p:stCondLst>
+                              <p:cond delay="6500"/>
+                            </p:stCondLst>
+                            <p:childTnLst>
+                              <p:par>
+                                <p:cTn id="19" presetID="5" presetClass="exit" presetSubtype="10" fill="hold" grpId="1" nodeType="afterEffect">
+                                  <p:stCondLst>
+                                    <p:cond delay="2000"/>
+                                  </p:stCondLst>
+                                  <p:childTnLst>
+                                    <p:animEffect transition="out" filter="checkerboard(across)">
+                                      <p:cBhvr>
+                                        <p:cTn id="20" dur="500"/>
+                                        <p:tgtEl>
+                                          <p:spTgt spid="8"/>
+                                        </p:tgtEl>
+                                      </p:cBhvr>
+                                    </p:animEffect>
+                                    <p:set>
+                                      <p:cBhvr>
+                                        <p:cTn id="21" dur="1" fill="hold">
+                                          <p:stCondLst>
+                                            <p:cond delay="499"/>
+                                          </p:stCondLst>
+                                        </p:cTn>
+                                        <p:tgtEl>
+                                          <p:spTgt spid="8"/>
+                                        </p:tgtEl>
+                                        <p:attrNameLst>
+                                          <p:attrName>style.visibility</p:attrName>
+                                        </p:attrNameLst>
+                                      </p:cBhvr>
+                                      <p:to>
+                                        <p:strVal val="hidden"/>
+                                      </p:to>
+                                    </p:set>
+                                  </p:childTnLst>
+                                </p:cTn>
+                              </p:par>
+                            </p:childTnLst>
+                          </p:cTn>
+                        </p:par>
                         <p:par>
                           <p:cTn id="22" fill="hold">
                             <p:stCondLst>
-                              <p:cond delay="0"/>
+                              <p:cond delay="9000"/>
                             </p:stCondLst>
                             <p:childTnLst>
                               <p:par>
-                                <p:cTn id="23" presetID="35" presetClass="path" presetSubtype="0" accel="50000" decel="50000" fill="hold" grpId="0" nodeType="clickEffect">
+                                <p:cTn id="23" presetID="3" presetClass="entr" presetSubtype="10" fill="hold" grpId="0" nodeType="afterEffect">
+                                  <p:stCondLst>
+                                    <p:cond delay="500"/>
+                                  </p:stCondLst>
+                                  <p:childTnLst>
+                                    <p:set>
+                                      <p:cBhvr>
+                                        <p:cTn id="24" dur="1" fill="hold">
+                                          <p:stCondLst>
+                                            <p:cond delay="0"/>
+                                          </p:stCondLst>
+                                        </p:cTn>
+                                        <p:tgtEl>
+                                          <p:spTgt spid="9"/>
+                                        </p:tgtEl>
+                                        <p:attrNameLst>
+                                          <p:attrName>style.visibility</p:attrName>
+                                        </p:attrNameLst>
+                                      </p:cBhvr>
+                                      <p:to>
+                                        <p:strVal val="visible"/>
+                                      </p:to>
+                                    </p:set>
+                                    <p:animEffect transition="in" filter="blinds(horizontal)">
+                                      <p:cBhvr>
+                                        <p:cTn id="25" dur="500"/>
+                                        <p:tgtEl>
+                                          <p:spTgt spid="9"/>
+                                        </p:tgtEl>
+                                      </p:cBhvr>
+                                    </p:animEffect>
+                                  </p:childTnLst>
+                                </p:cTn>
+                              </p:par>
+                            </p:childTnLst>
+                          </p:cTn>
+                        </p:par>
+                        <p:par>
+                          <p:cTn id="26" fill="hold">
+                            <p:stCondLst>
+                              <p:cond delay="10000"/>
+                            </p:stCondLst>
+                            <p:childTnLst>
+                              <p:par>
+                                <p:cTn id="27" presetID="3" presetClass="exit" presetSubtype="10" fill="hold" grpId="1" nodeType="afterEffect">
+                                  <p:stCondLst>
+                                    <p:cond delay="2000"/>
+                                  </p:stCondLst>
+                                  <p:childTnLst>
+                                    <p:animEffect transition="out" filter="blinds(horizontal)">
+                                      <p:cBhvr>
+                                        <p:cTn id="28" dur="500"/>
+                                        <p:tgtEl>
+                                          <p:spTgt spid="9"/>
+                                        </p:tgtEl>
+                                      </p:cBhvr>
+                                    </p:animEffect>
+                                    <p:set>
+                                      <p:cBhvr>
+                                        <p:cTn id="29" dur="1" fill="hold">
+                                          <p:stCondLst>
+                                            <p:cond delay="499"/>
+                                          </p:stCondLst>
+                                        </p:cTn>
+                                        <p:tgtEl>
+                                          <p:spTgt spid="9"/>
+                                        </p:tgtEl>
+                                        <p:attrNameLst>
+                                          <p:attrName>style.visibility</p:attrName>
+                                        </p:attrNameLst>
+                                      </p:cBhvr>
+                                      <p:to>
+                                        <p:strVal val="hidden"/>
+                                      </p:to>
+                                    </p:set>
+                                  </p:childTnLst>
+                                </p:cTn>
+                              </p:par>
+                            </p:childTnLst>
+                          </p:cTn>
+                        </p:par>
+                        <p:par>
+                          <p:cTn id="30" fill="hold">
+                            <p:stCondLst>
+                              <p:cond delay="12500"/>
+                            </p:stCondLst>
+                            <p:childTnLst>
+                              <p:par>
+                                <p:cTn id="31" presetID="8" presetClass="entr" presetSubtype="16" fill="hold" grpId="0" nodeType="afterEffect">
+                                  <p:stCondLst>
+                                    <p:cond delay="500"/>
+                                  </p:stCondLst>
+                                  <p:childTnLst>
+                                    <p:set>
+                                      <p:cBhvr>
+                                        <p:cTn id="32" dur="1" fill="hold">
+                                          <p:stCondLst>
+                                            <p:cond delay="0"/>
+                                          </p:stCondLst>
+                                        </p:cTn>
+                                        <p:tgtEl>
+                                          <p:spTgt spid="10"/>
+                                        </p:tgtEl>
+                                        <p:attrNameLst>
+                                          <p:attrName>style.visibility</p:attrName>
+                                        </p:attrNameLst>
+                                      </p:cBhvr>
+                                      <p:to>
+                                        <p:strVal val="visible"/>
+                                      </p:to>
+                                    </p:set>
+                                    <p:animEffect transition="in" filter="diamond(in)">
+                                      <p:cBhvr>
+                                        <p:cTn id="33" dur="2000"/>
+                                        <p:tgtEl>
+                                          <p:spTgt spid="10"/>
+                                        </p:tgtEl>
+                                      </p:cBhvr>
+                                    </p:animEffect>
+                                  </p:childTnLst>
+                                </p:cTn>
+                              </p:par>
+                            </p:childTnLst>
+                          </p:cTn>
+                        </p:par>
+                        <p:par>
+                          <p:cTn id="34" fill="hold">
+                            <p:stCondLst>
+                              <p:cond delay="15000"/>
+                            </p:stCondLst>
+                            <p:childTnLst>
+                              <p:par>
+                                <p:cTn id="35" presetID="8" presetClass="exit" presetSubtype="16" fill="hold" grpId="1" nodeType="afterEffect">
                                   <p:stCondLst>
                                     <p:cond delay="0"/>
                                   </p:stCondLst>
                                   <p:childTnLst>
-                                    <p:animMotion origin="layout" path="M -1.94444E-6 -4.07407E-6 L -0.92014 -4.07407E-6 " pathEditMode="relative" rAng="0" ptsTypes="AA">
+                                    <p:animEffect transition="out" filter="diamond(in)">
                                       <p:cBhvr>
-                                        <p:cTn id="24" dur="2000" fill="hold"/>
+                                        <p:cTn id="36" dur="2000"/>
                                         <p:tgtEl>
-                                          <p:spTgt spid="12"/>
+                                          <p:spTgt spid="10"/>
+                                        </p:tgtEl>
+                                      </p:cBhvr>
+                                    </p:animEffect>
+                                    <p:set>
+                                      <p:cBhvr>
+                                        <p:cTn id="37" dur="1" fill="hold">
+                                          <p:stCondLst>
+                                            <p:cond delay="1999"/>
+                                          </p:stCondLst>
+                                        </p:cTn>
+                                        <p:tgtEl>
+                                          <p:spTgt spid="10"/>
                                         </p:tgtEl>
                                         <p:attrNameLst>
-                                          <p:attrName>ppt_x</p:attrName>
-                                          <p:attrName>ppt_y</p:attrName>
+                                          <p:attrName>style.visibility</p:attrName>
                                         </p:attrNameLst>
                                       </p:cBhvr>
-                                      <p:rCtr x="-460" y="0"/>
-                                    </p:animMotion>
+                                      <p:to>
+                                        <p:strVal val="hidden"/>
+                                      </p:to>
+                                    </p:set>
                                   </p:childTnLst>
                                 </p:cTn>
                               </p:par>
+                            </p:childTnLst>
+                          </p:cTn>
+                        </p:par>
+                        <p:par>
+                          <p:cTn id="38" fill="hold">
+                            <p:stCondLst>
+                              <p:cond delay="17000"/>
+                            </p:stCondLst>
+                            <p:childTnLst>
                               <p:par>
-                                <p:cTn id="25" presetID="35" presetClass="path" presetSubtype="0" accel="50000" decel="50000" fill="hold" nodeType="withEffect">
+                                <p:cTn id="39" presetID="2" presetClass="entr" presetSubtype="4" fill="hold" grpId="0" nodeType="afterEffect">
                                   <p:stCondLst>
                                     <p:cond delay="0"/>
                                   </p:stCondLst>
                                   <p:childTnLst>
-                                    <p:animMotion origin="layout" path="M -2.22222E-6 -1.48148E-6 L -0.9309 -1.48148E-6 " pathEditMode="relative" rAng="0" ptsTypes="AA">
+                                    <p:set>
                                       <p:cBhvr>
-                                        <p:cTn id="26" dur="2000" fill="hold"/>
+                                        <p:cTn id="40" dur="1" fill="hold">
+                                          <p:stCondLst>
+                                            <p:cond delay="0"/>
+                                          </p:stCondLst>
+                                        </p:cTn>
                                         <p:tgtEl>
-                                          <p:spTgt spid="13"/>
+                                          <p:spTgt spid="11"/>
+                                        </p:tgtEl>
+                                        <p:attrNameLst>
+                                          <p:attrName>style.visibility</p:attrName>
+                                        </p:attrNameLst>
+                                      </p:cBhvr>
+                                      <p:to>
+                                        <p:strVal val="visible"/>
+                                      </p:to>
+                                    </p:set>
+                                    <p:anim calcmode="lin" valueType="num">
+                                      <p:cBhvr additive="base">
+                                        <p:cTn id="41" dur="500" fill="hold"/>
+                                        <p:tgtEl>
+                                          <p:spTgt spid="11"/>
                                         </p:tgtEl>
                                         <p:attrNameLst>
                                           <p:attrName>ppt_x</p:attrName>
+                                        </p:attrNameLst>
+                                      </p:cBhvr>
+                                      <p:tavLst>
+                                        <p:tav tm="0">
+                                          <p:val>
+                                            <p:strVal val="#ppt_x"/>
+                                          </p:val>
+                                        </p:tav>
+                                        <p:tav tm="100000">
+                                          <p:val>
+                                            <p:strVal val="#ppt_x"/>
+                                          </p:val>
+                                        </p:tav>
+                                      </p:tavLst>
+                                    </p:anim>
+                                    <p:anim calcmode="lin" valueType="num">
+                                      <p:cBhvr additive="base">
+                                        <p:cTn id="42" dur="500" fill="hold"/>
+                                        <p:tgtEl>
+                                          <p:spTgt spid="11"/>
+                                        </p:tgtEl>
+                                        <p:attrNameLst>
                                           <p:attrName>ppt_y</p:attrName>
                                         </p:attrNameLst>
                                       </p:cBhvr>
-                                      <p:rCtr x="-465" y="0"/>
-                                    </p:animMotion>
+                                      <p:tavLst>
+                                        <p:tav tm="0">
+                                          <p:val>
+                                            <p:strVal val="1+#ppt_h/2"/>
+                                          </p:val>
+                                        </p:tav>
+                                        <p:tav tm="100000">
+                                          <p:val>
+                                            <p:strVal val="#ppt_y"/>
+                                          </p:val>
+                                        </p:tav>
+                                      </p:tavLst>
+                                    </p:anim>
+                                  </p:childTnLst>
+                                </p:cTn>
+                              </p:par>
+                            </p:childTnLst>
+                          </p:cTn>
+                        </p:par>
+                        <p:par>
+                          <p:cTn id="43" fill="hold">
+                            <p:stCondLst>
+                              <p:cond delay="17500"/>
+                            </p:stCondLst>
+                            <p:childTnLst>
+                              <p:par>
+                                <p:cTn id="44" presetID="2" presetClass="exit" presetSubtype="4" fill="hold" grpId="1" nodeType="afterEffect">
+                                  <p:stCondLst>
+                                    <p:cond delay="0"/>
+                                  </p:stCondLst>
+                                  <p:childTnLst>
+                                    <p:anim calcmode="lin" valueType="num">
+                                      <p:cBhvr additive="base">
+                                        <p:cTn id="45" dur="500"/>
+                                        <p:tgtEl>
+                                          <p:spTgt spid="11"/>
+                                        </p:tgtEl>
+                                        <p:attrNameLst>
+                                          <p:attrName>ppt_x</p:attrName>
+                                        </p:attrNameLst>
+                                      </p:cBhvr>
+                                      <p:tavLst>
+                                        <p:tav tm="0">
+                                          <p:val>
+                                            <p:strVal val="ppt_x"/>
+                                          </p:val>
+                                        </p:tav>
+                                        <p:tav tm="100000">
+                                          <p:val>
+                                            <p:strVal val="ppt_x"/>
+                                          </p:val>
+                                        </p:tav>
+                                      </p:tavLst>
+                                    </p:anim>
+                                    <p:anim calcmode="lin" valueType="num">
+                                      <p:cBhvr additive="base">
+                                        <p:cTn id="46" dur="500"/>
+                                        <p:tgtEl>
+                                          <p:spTgt spid="11"/>
+                                        </p:tgtEl>
+                                        <p:attrNameLst>
+                                          <p:attrName>ppt_y</p:attrName>
+                                        </p:attrNameLst>
+                                      </p:cBhvr>
+                                      <p:tavLst>
+                                        <p:tav tm="0">
+                                          <p:val>
+                                            <p:strVal val="ppt_y"/>
+                                          </p:val>
+                                        </p:tav>
+                                        <p:tav tm="100000">
+                                          <p:val>
+                                            <p:strVal val="1+ppt_h/2"/>
+                                          </p:val>
+                                        </p:tav>
+                                      </p:tavLst>
+                                    </p:anim>
+                                    <p:set>
+                                      <p:cBhvr>
+                                        <p:cTn id="47" dur="1" fill="hold">
+                                          <p:stCondLst>
+                                            <p:cond delay="499"/>
+                                          </p:stCondLst>
+                                        </p:cTn>
+                                        <p:tgtEl>
+                                          <p:spTgt spid="11"/>
+                                        </p:tgtEl>
+                                        <p:attrNameLst>
+                                          <p:attrName>style.visibility</p:attrName>
+                                        </p:attrNameLst>
+                                      </p:cBhvr>
+                                      <p:to>
+                                        <p:strVal val="hidden"/>
+                                      </p:to>
+                                    </p:set>
                                   </p:childTnLst>
                                 </p:cTn>
                               </p:par>
@@ -29795,11 +30738,16 @@
       </p:par>
     </p:tnLst>
     <p:bldLst>
-      <p:bldP spid="6" grpId="0"/>
-      <p:bldP spid="7" grpId="0"/>
-      <p:bldP spid="8" grpId="0"/>
-      <p:bldP spid="10" grpId="0"/>
-      <p:bldP spid="12" grpId="0"/>
+      <p:bldP spid="6" grpId="0" animBg="1"/>
+      <p:bldP spid="6" grpId="1" animBg="1"/>
+      <p:bldP spid="8" grpId="0" animBg="1"/>
+      <p:bldP spid="8" grpId="1" animBg="1"/>
+      <p:bldP spid="9" grpId="0" animBg="1"/>
+      <p:bldP spid="9" grpId="1" animBg="1"/>
+      <p:bldP spid="10" grpId="0" animBg="1"/>
+      <p:bldP spid="10" grpId="1" animBg="1"/>
+      <p:bldP spid="11" grpId="0" animBg="1"/>
+      <p:bldP spid="11" grpId="1" animBg="1"/>
     </p:bldLst>
   </p:timing>
 </p:sld>

</xml_diff>